<commit_message>
Change link to API docs
</commit_message>
<xml_diff>
--- a/services/IotDriverInsights/images/sequence_diagram.pptx
+++ b/services/IotDriverInsights/images/sequence_diagram.pptx
@@ -2,19 +2,19 @@
 <file path=ppt/presentation.xml><?xml version="1.0" encoding="utf-8"?>
 <p:presentation xmlns:a="http://schemas.openxmlformats.org/drawingml/2006/main" xmlns:r="http://schemas.openxmlformats.org/officeDocument/2006/relationships" xmlns:p="http://schemas.openxmlformats.org/presentationml/2006/main" saveSubsetFonts="1">
   <p:sldMasterIdLst>
-    <p:sldMasterId id="2147483660" r:id="rId1"/>
+    <p:sldMasterId id="2147483696" r:id="rId1"/>
   </p:sldMasterIdLst>
   <p:sldIdLst>
     <p:sldId id="256" r:id="rId2"/>
   </p:sldIdLst>
-  <p:sldSz cx="6858000" cy="9144000" type="screen4x3"/>
+  <p:sldSz cx="9144000" cy="6858000" type="screen4x3"/>
   <p:notesSz cx="6858000" cy="9144000"/>
   <p:defaultTextStyle>
     <a:defPPr>
       <a:defRPr lang="ja-JP"/>
     </a:defPPr>
-    <a:lvl1pPr marL="0" algn="l" defTabSz="914400" rtl="0" eaLnBrk="1" latinLnBrk="0" hangingPunct="1">
-      <a:defRPr kumimoji="1" sz="1800" kern="1200">
+    <a:lvl1pPr marL="0" algn="l" defTabSz="576072" rtl="0" eaLnBrk="1" latinLnBrk="0" hangingPunct="1">
+      <a:defRPr kumimoji="1" sz="1134" kern="1200">
         <a:solidFill>
           <a:schemeClr val="tx1"/>
         </a:solidFill>
@@ -23,8 +23,8 @@
         <a:cs typeface="+mn-cs"/>
       </a:defRPr>
     </a:lvl1pPr>
-    <a:lvl2pPr marL="457200" algn="l" defTabSz="914400" rtl="0" eaLnBrk="1" latinLnBrk="0" hangingPunct="1">
-      <a:defRPr kumimoji="1" sz="1800" kern="1200">
+    <a:lvl2pPr marL="288036" algn="l" defTabSz="576072" rtl="0" eaLnBrk="1" latinLnBrk="0" hangingPunct="1">
+      <a:defRPr kumimoji="1" sz="1134" kern="1200">
         <a:solidFill>
           <a:schemeClr val="tx1"/>
         </a:solidFill>
@@ -33,8 +33,8 @@
         <a:cs typeface="+mn-cs"/>
       </a:defRPr>
     </a:lvl2pPr>
-    <a:lvl3pPr marL="914400" algn="l" defTabSz="914400" rtl="0" eaLnBrk="1" latinLnBrk="0" hangingPunct="1">
-      <a:defRPr kumimoji="1" sz="1800" kern="1200">
+    <a:lvl3pPr marL="576072" algn="l" defTabSz="576072" rtl="0" eaLnBrk="1" latinLnBrk="0" hangingPunct="1">
+      <a:defRPr kumimoji="1" sz="1134" kern="1200">
         <a:solidFill>
           <a:schemeClr val="tx1"/>
         </a:solidFill>
@@ -43,8 +43,8 @@
         <a:cs typeface="+mn-cs"/>
       </a:defRPr>
     </a:lvl3pPr>
-    <a:lvl4pPr marL="1371600" algn="l" defTabSz="914400" rtl="0" eaLnBrk="1" latinLnBrk="0" hangingPunct="1">
-      <a:defRPr kumimoji="1" sz="1800" kern="1200">
+    <a:lvl4pPr marL="864108" algn="l" defTabSz="576072" rtl="0" eaLnBrk="1" latinLnBrk="0" hangingPunct="1">
+      <a:defRPr kumimoji="1" sz="1134" kern="1200">
         <a:solidFill>
           <a:schemeClr val="tx1"/>
         </a:solidFill>
@@ -53,8 +53,8 @@
         <a:cs typeface="+mn-cs"/>
       </a:defRPr>
     </a:lvl4pPr>
-    <a:lvl5pPr marL="1828800" algn="l" defTabSz="914400" rtl="0" eaLnBrk="1" latinLnBrk="0" hangingPunct="1">
-      <a:defRPr kumimoji="1" sz="1800" kern="1200">
+    <a:lvl5pPr marL="1152144" algn="l" defTabSz="576072" rtl="0" eaLnBrk="1" latinLnBrk="0" hangingPunct="1">
+      <a:defRPr kumimoji="1" sz="1134" kern="1200">
         <a:solidFill>
           <a:schemeClr val="tx1"/>
         </a:solidFill>
@@ -63,8 +63,8 @@
         <a:cs typeface="+mn-cs"/>
       </a:defRPr>
     </a:lvl5pPr>
-    <a:lvl6pPr marL="2286000" algn="l" defTabSz="914400" rtl="0" eaLnBrk="1" latinLnBrk="0" hangingPunct="1">
-      <a:defRPr kumimoji="1" sz="1800" kern="1200">
+    <a:lvl6pPr marL="1440180" algn="l" defTabSz="576072" rtl="0" eaLnBrk="1" latinLnBrk="0" hangingPunct="1">
+      <a:defRPr kumimoji="1" sz="1134" kern="1200">
         <a:solidFill>
           <a:schemeClr val="tx1"/>
         </a:solidFill>
@@ -73,8 +73,8 @@
         <a:cs typeface="+mn-cs"/>
       </a:defRPr>
     </a:lvl6pPr>
-    <a:lvl7pPr marL="2743200" algn="l" defTabSz="914400" rtl="0" eaLnBrk="1" latinLnBrk="0" hangingPunct="1">
-      <a:defRPr kumimoji="1" sz="1800" kern="1200">
+    <a:lvl7pPr marL="1728216" algn="l" defTabSz="576072" rtl="0" eaLnBrk="1" latinLnBrk="0" hangingPunct="1">
+      <a:defRPr kumimoji="1" sz="1134" kern="1200">
         <a:solidFill>
           <a:schemeClr val="tx1"/>
         </a:solidFill>
@@ -83,8 +83,8 @@
         <a:cs typeface="+mn-cs"/>
       </a:defRPr>
     </a:lvl7pPr>
-    <a:lvl8pPr marL="3200400" algn="l" defTabSz="914400" rtl="0" eaLnBrk="1" latinLnBrk="0" hangingPunct="1">
-      <a:defRPr kumimoji="1" sz="1800" kern="1200">
+    <a:lvl8pPr marL="2016252" algn="l" defTabSz="576072" rtl="0" eaLnBrk="1" latinLnBrk="0" hangingPunct="1">
+      <a:defRPr kumimoji="1" sz="1134" kern="1200">
         <a:solidFill>
           <a:schemeClr val="tx1"/>
         </a:solidFill>
@@ -93,8 +93,8 @@
         <a:cs typeface="+mn-cs"/>
       </a:defRPr>
     </a:lvl8pPr>
-    <a:lvl9pPr marL="3657600" algn="l" defTabSz="914400" rtl="0" eaLnBrk="1" latinLnBrk="0" hangingPunct="1">
-      <a:defRPr kumimoji="1" sz="1800" kern="1200">
+    <a:lvl9pPr marL="2304288" algn="l" defTabSz="576072" rtl="0" eaLnBrk="1" latinLnBrk="0" hangingPunct="1">
+      <a:defRPr kumimoji="1" sz="1134" kern="1200">
         <a:solidFill>
           <a:schemeClr val="tx1"/>
         </a:solidFill>
@@ -106,7 +106,18 @@
   </p:defaultTextStyle>
   <p:extLst>
     <p:ext uri="{EFAFB233-063F-42B5-8137-9DF3F51BA10A}">
-      <p15:sldGuideLst xmlns:p15="http://schemas.microsoft.com/office/powerpoint/2012/main"/>
+      <p15:sldGuideLst xmlns:p15="http://schemas.microsoft.com/office/powerpoint/2012/main">
+        <p15:guide id="1" orient="horz" pos="2160" userDrawn="1">
+          <p15:clr>
+            <a:srgbClr val="A4A3A4"/>
+          </p15:clr>
+        </p15:guide>
+        <p15:guide id="2" pos="1655" userDrawn="1">
+          <p15:clr>
+            <a:srgbClr val="A4A3A4"/>
+          </p15:clr>
+        </p15:guide>
+      </p15:sldGuideLst>
     </p:ext>
   </p:extLst>
 </p:presentation>
@@ -141,15 +152,15 @@
         </p:nvSpPr>
         <p:spPr>
           <a:xfrm>
-            <a:off x="514350" y="1496484"/>
-            <a:ext cx="5829300" cy="3183467"/>
+            <a:off x="685800" y="1122363"/>
+            <a:ext cx="7772400" cy="2387600"/>
           </a:xfrm>
         </p:spPr>
         <p:txBody>
           <a:bodyPr anchor="b"/>
           <a:lstStyle>
             <a:lvl1pPr algn="ctr">
-              <a:defRPr sz="4500"/>
+              <a:defRPr sz="6000"/>
             </a:lvl1pPr>
           </a:lstStyle>
           <a:p>
@@ -173,8 +184,8 @@
         </p:nvSpPr>
         <p:spPr>
           <a:xfrm>
-            <a:off x="857250" y="4802717"/>
-            <a:ext cx="5143500" cy="2207683"/>
+            <a:off x="1143000" y="3602038"/>
+            <a:ext cx="6858000" cy="1655762"/>
           </a:xfrm>
         </p:spPr>
         <p:txBody>
@@ -182,39 +193,39 @@
           <a:lstStyle>
             <a:lvl1pPr marL="0" indent="0" algn="ctr">
               <a:buNone/>
+              <a:defRPr sz="2400"/>
+            </a:lvl1pPr>
+            <a:lvl2pPr marL="457200" indent="0" algn="ctr">
+              <a:buNone/>
+              <a:defRPr sz="2000"/>
+            </a:lvl2pPr>
+            <a:lvl3pPr marL="914400" indent="0" algn="ctr">
+              <a:buNone/>
               <a:defRPr sz="1800"/>
-            </a:lvl1pPr>
-            <a:lvl2pPr marL="342900" indent="0" algn="ctr">
-              <a:buNone/>
-              <a:defRPr sz="1500"/>
-            </a:lvl2pPr>
-            <a:lvl3pPr marL="685800" indent="0" algn="ctr">
-              <a:buNone/>
-              <a:defRPr sz="1350"/>
             </a:lvl3pPr>
-            <a:lvl4pPr marL="1028700" indent="0" algn="ctr">
-              <a:buNone/>
-              <a:defRPr sz="1200"/>
+            <a:lvl4pPr marL="1371600" indent="0" algn="ctr">
+              <a:buNone/>
+              <a:defRPr sz="1600"/>
             </a:lvl4pPr>
-            <a:lvl5pPr marL="1371600" indent="0" algn="ctr">
-              <a:buNone/>
-              <a:defRPr sz="1200"/>
+            <a:lvl5pPr marL="1828800" indent="0" algn="ctr">
+              <a:buNone/>
+              <a:defRPr sz="1600"/>
             </a:lvl5pPr>
-            <a:lvl6pPr marL="1714500" indent="0" algn="ctr">
-              <a:buNone/>
-              <a:defRPr sz="1200"/>
+            <a:lvl6pPr marL="2286000" indent="0" algn="ctr">
+              <a:buNone/>
+              <a:defRPr sz="1600"/>
             </a:lvl6pPr>
-            <a:lvl7pPr marL="2057400" indent="0" algn="ctr">
-              <a:buNone/>
-              <a:defRPr sz="1200"/>
+            <a:lvl7pPr marL="2743200" indent="0" algn="ctr">
+              <a:buNone/>
+              <a:defRPr sz="1600"/>
             </a:lvl7pPr>
-            <a:lvl8pPr marL="2400300" indent="0" algn="ctr">
-              <a:buNone/>
-              <a:defRPr sz="1200"/>
+            <a:lvl8pPr marL="3200400" indent="0" algn="ctr">
+              <a:buNone/>
+              <a:defRPr sz="1600"/>
             </a:lvl8pPr>
-            <a:lvl9pPr marL="2743200" indent="0" algn="ctr">
-              <a:buNone/>
-              <a:defRPr sz="1200"/>
+            <a:lvl9pPr marL="3657600" indent="0" algn="ctr">
+              <a:buNone/>
+              <a:defRPr sz="1600"/>
             </a:lvl9pPr>
           </a:lstStyle>
           <a:p>
@@ -243,7 +254,7 @@
           <a:p>
             <a:fld id="{DE3AD58E-45E1-4C59-9E64-AA667E6AFE1E}" type="datetimeFigureOut">
               <a:rPr kumimoji="1" lang="ja-JP" altLang="en-US" smtClean="0"/>
-              <a:t>2016/3/24</a:t>
+              <a:t>2016/5/2</a:t>
             </a:fld>
             <a:endParaRPr kumimoji="1" lang="ja-JP" altLang="en-US"/>
           </a:p>
@@ -294,7 +305,7 @@
     </p:spTree>
     <p:extLst>
       <p:ext uri="{BB962C8B-B14F-4D97-AF65-F5344CB8AC3E}">
-        <p14:creationId xmlns:p14="http://schemas.microsoft.com/office/powerpoint/2010/main" val="1030055791"/>
+        <p14:creationId xmlns:p14="http://schemas.microsoft.com/office/powerpoint/2010/main" val="128959482"/>
       </p:ext>
     </p:extLst>
   </p:cSld>
@@ -445,7 +456,7 @@
           <a:p>
             <a:fld id="{DE3AD58E-45E1-4C59-9E64-AA667E6AFE1E}" type="datetimeFigureOut">
               <a:rPr kumimoji="1" lang="ja-JP" altLang="en-US" smtClean="0"/>
-              <a:t>2016/3/24</a:t>
+              <a:t>2016/5/2</a:t>
             </a:fld>
             <a:endParaRPr kumimoji="1" lang="ja-JP" altLang="en-US"/>
           </a:p>
@@ -496,7 +507,7 @@
     </p:spTree>
     <p:extLst>
       <p:ext uri="{BB962C8B-B14F-4D97-AF65-F5344CB8AC3E}">
-        <p14:creationId xmlns:p14="http://schemas.microsoft.com/office/powerpoint/2010/main" val="1425278081"/>
+        <p14:creationId xmlns:p14="http://schemas.microsoft.com/office/powerpoint/2010/main" val="1333912222"/>
       </p:ext>
     </p:extLst>
   </p:cSld>
@@ -508,7 +519,7 @@
 
 <file path=ppt/slideLayouts/slideLayout11.xml><?xml version="1.0" encoding="utf-8"?>
 <p:sldLayout xmlns:a="http://schemas.openxmlformats.org/drawingml/2006/main" xmlns:r="http://schemas.openxmlformats.org/officeDocument/2006/relationships" xmlns:p="http://schemas.openxmlformats.org/presentationml/2006/main" type="vertTitleAndTx" preserve="1">
-  <p:cSld name="縦書きタイトルと&#10;縦書きテキスト">
+  <p:cSld name="縦書きタイトルと縦書きテキスト">
     <p:spTree>
       <p:nvGrpSpPr>
         <p:cNvPr id="1" name=""/>
@@ -535,8 +546,8 @@
         </p:nvSpPr>
         <p:spPr>
           <a:xfrm>
-            <a:off x="4907757" y="486834"/>
-            <a:ext cx="1478756" cy="7749117"/>
+            <a:off x="6543675" y="365125"/>
+            <a:ext cx="1971675" cy="5811838"/>
           </a:xfrm>
         </p:spPr>
         <p:txBody>
@@ -563,8 +574,8 @@
         </p:nvSpPr>
         <p:spPr>
           <a:xfrm>
-            <a:off x="471488" y="486834"/>
-            <a:ext cx="4350544" cy="7749117"/>
+            <a:off x="628650" y="365125"/>
+            <a:ext cx="5800725" cy="5811838"/>
           </a:xfrm>
         </p:spPr>
         <p:txBody>
@@ -657,7 +668,7 @@
           <a:p>
             <a:fld id="{DE3AD58E-45E1-4C59-9E64-AA667E6AFE1E}" type="datetimeFigureOut">
               <a:rPr kumimoji="1" lang="ja-JP" altLang="en-US" smtClean="0"/>
-              <a:t>2016/3/24</a:t>
+              <a:t>2016/5/2</a:t>
             </a:fld>
             <a:endParaRPr kumimoji="1" lang="ja-JP" altLang="en-US"/>
           </a:p>
@@ -708,7 +719,7 @@
     </p:spTree>
     <p:extLst>
       <p:ext uri="{BB962C8B-B14F-4D97-AF65-F5344CB8AC3E}">
-        <p14:creationId xmlns:p14="http://schemas.microsoft.com/office/powerpoint/2010/main" val="2318110838"/>
+        <p14:creationId xmlns:p14="http://schemas.microsoft.com/office/powerpoint/2010/main" val="1480924121"/>
       </p:ext>
     </p:extLst>
   </p:cSld>
@@ -859,7 +870,7 @@
           <a:p>
             <a:fld id="{DE3AD58E-45E1-4C59-9E64-AA667E6AFE1E}" type="datetimeFigureOut">
               <a:rPr kumimoji="1" lang="ja-JP" altLang="en-US" smtClean="0"/>
-              <a:t>2016/3/24</a:t>
+              <a:t>2016/5/2</a:t>
             </a:fld>
             <a:endParaRPr kumimoji="1" lang="ja-JP" altLang="en-US"/>
           </a:p>
@@ -910,7 +921,7 @@
     </p:spTree>
     <p:extLst>
       <p:ext uri="{BB962C8B-B14F-4D97-AF65-F5344CB8AC3E}">
-        <p14:creationId xmlns:p14="http://schemas.microsoft.com/office/powerpoint/2010/main" val="1126386747"/>
+        <p14:creationId xmlns:p14="http://schemas.microsoft.com/office/powerpoint/2010/main" val="611014151"/>
       </p:ext>
     </p:extLst>
   </p:cSld>
@@ -949,15 +960,15 @@
         </p:nvSpPr>
         <p:spPr>
           <a:xfrm>
-            <a:off x="467916" y="2279653"/>
-            <a:ext cx="5915025" cy="3803649"/>
+            <a:off x="623888" y="1709739"/>
+            <a:ext cx="7886700" cy="2852737"/>
           </a:xfrm>
         </p:spPr>
         <p:txBody>
           <a:bodyPr anchor="b"/>
           <a:lstStyle>
             <a:lvl1pPr>
-              <a:defRPr sz="4500"/>
+              <a:defRPr sz="6000"/>
             </a:lvl1pPr>
           </a:lstStyle>
           <a:p>
@@ -981,8 +992,8 @@
         </p:nvSpPr>
         <p:spPr>
           <a:xfrm>
-            <a:off x="467916" y="6119286"/>
-            <a:ext cx="5915025" cy="2000249"/>
+            <a:off x="623888" y="4589464"/>
+            <a:ext cx="7886700" cy="1500187"/>
           </a:xfrm>
         </p:spPr>
         <p:txBody>
@@ -990,15 +1001,15 @@
           <a:lstStyle>
             <a:lvl1pPr marL="0" indent="0">
               <a:buNone/>
-              <a:defRPr sz="1800">
+              <a:defRPr sz="2400">
                 <a:solidFill>
                   <a:schemeClr val="tx1"/>
                 </a:solidFill>
               </a:defRPr>
             </a:lvl1pPr>
-            <a:lvl2pPr marL="342900" indent="0">
-              <a:buNone/>
-              <a:defRPr sz="1500">
+            <a:lvl2pPr marL="457200" indent="0">
+              <a:buNone/>
+              <a:defRPr sz="2000">
                 <a:solidFill>
                   <a:schemeClr val="tx1">
                     <a:tint val="75000"/>
@@ -1006,9 +1017,9 @@
                 </a:solidFill>
               </a:defRPr>
             </a:lvl2pPr>
-            <a:lvl3pPr marL="685800" indent="0">
-              <a:buNone/>
-              <a:defRPr sz="1350">
+            <a:lvl3pPr marL="914400" indent="0">
+              <a:buNone/>
+              <a:defRPr sz="1800">
                 <a:solidFill>
                   <a:schemeClr val="tx1">
                     <a:tint val="75000"/>
@@ -1016,9 +1027,9 @@
                 </a:solidFill>
               </a:defRPr>
             </a:lvl3pPr>
-            <a:lvl4pPr marL="1028700" indent="0">
-              <a:buNone/>
-              <a:defRPr sz="1200">
+            <a:lvl4pPr marL="1371600" indent="0">
+              <a:buNone/>
+              <a:defRPr sz="1600">
                 <a:solidFill>
                   <a:schemeClr val="tx1">
                     <a:tint val="75000"/>
@@ -1026,9 +1037,9 @@
                 </a:solidFill>
               </a:defRPr>
             </a:lvl4pPr>
-            <a:lvl5pPr marL="1371600" indent="0">
-              <a:buNone/>
-              <a:defRPr sz="1200">
+            <a:lvl5pPr marL="1828800" indent="0">
+              <a:buNone/>
+              <a:defRPr sz="1600">
                 <a:solidFill>
                   <a:schemeClr val="tx1">
                     <a:tint val="75000"/>
@@ -1036,9 +1047,9 @@
                 </a:solidFill>
               </a:defRPr>
             </a:lvl5pPr>
-            <a:lvl6pPr marL="1714500" indent="0">
-              <a:buNone/>
-              <a:defRPr sz="1200">
+            <a:lvl6pPr marL="2286000" indent="0">
+              <a:buNone/>
+              <a:defRPr sz="1600">
                 <a:solidFill>
                   <a:schemeClr val="tx1">
                     <a:tint val="75000"/>
@@ -1046,9 +1057,9 @@
                 </a:solidFill>
               </a:defRPr>
             </a:lvl6pPr>
-            <a:lvl7pPr marL="2057400" indent="0">
-              <a:buNone/>
-              <a:defRPr sz="1200">
+            <a:lvl7pPr marL="2743200" indent="0">
+              <a:buNone/>
+              <a:defRPr sz="1600">
                 <a:solidFill>
                   <a:schemeClr val="tx1">
                     <a:tint val="75000"/>
@@ -1056,9 +1067,9 @@
                 </a:solidFill>
               </a:defRPr>
             </a:lvl7pPr>
-            <a:lvl8pPr marL="2400300" indent="0">
-              <a:buNone/>
-              <a:defRPr sz="1200">
+            <a:lvl8pPr marL="3200400" indent="0">
+              <a:buNone/>
+              <a:defRPr sz="1600">
                 <a:solidFill>
                   <a:schemeClr val="tx1">
                     <a:tint val="75000"/>
@@ -1066,9 +1077,9 @@
                 </a:solidFill>
               </a:defRPr>
             </a:lvl8pPr>
-            <a:lvl9pPr marL="2743200" indent="0">
-              <a:buNone/>
-              <a:defRPr sz="1200">
+            <a:lvl9pPr marL="3657600" indent="0">
+              <a:buNone/>
+              <a:defRPr sz="1600">
                 <a:solidFill>
                   <a:schemeClr val="tx1">
                     <a:tint val="75000"/>
@@ -1103,7 +1114,7 @@
           <a:p>
             <a:fld id="{DE3AD58E-45E1-4C59-9E64-AA667E6AFE1E}" type="datetimeFigureOut">
               <a:rPr kumimoji="1" lang="ja-JP" altLang="en-US" smtClean="0"/>
-              <a:t>2016/3/24</a:t>
+              <a:t>2016/5/2</a:t>
             </a:fld>
             <a:endParaRPr kumimoji="1" lang="ja-JP" altLang="en-US"/>
           </a:p>
@@ -1154,7 +1165,7 @@
     </p:spTree>
     <p:extLst>
       <p:ext uri="{BB962C8B-B14F-4D97-AF65-F5344CB8AC3E}">
-        <p14:creationId xmlns:p14="http://schemas.microsoft.com/office/powerpoint/2010/main" val="2252064296"/>
+        <p14:creationId xmlns:p14="http://schemas.microsoft.com/office/powerpoint/2010/main" val="48035903"/>
       </p:ext>
     </p:extLst>
   </p:cSld>
@@ -1216,8 +1227,8 @@
         </p:nvSpPr>
         <p:spPr>
           <a:xfrm>
-            <a:off x="471488" y="2434167"/>
-            <a:ext cx="2914650" cy="5801784"/>
+            <a:off x="628650" y="1825625"/>
+            <a:ext cx="3886200" cy="4351338"/>
           </a:xfrm>
         </p:spPr>
         <p:txBody>
@@ -1305,8 +1316,8 @@
         </p:nvSpPr>
         <p:spPr>
           <a:xfrm>
-            <a:off x="3471863" y="2434167"/>
-            <a:ext cx="2914650" cy="5801784"/>
+            <a:off x="4629150" y="1825625"/>
+            <a:ext cx="3886200" cy="4351338"/>
           </a:xfrm>
         </p:spPr>
         <p:txBody>
@@ -1399,7 +1410,7 @@
           <a:p>
             <a:fld id="{DE3AD58E-45E1-4C59-9E64-AA667E6AFE1E}" type="datetimeFigureOut">
               <a:rPr kumimoji="1" lang="ja-JP" altLang="en-US" smtClean="0"/>
-              <a:t>2016/3/24</a:t>
+              <a:t>2016/5/2</a:t>
             </a:fld>
             <a:endParaRPr kumimoji="1" lang="ja-JP" altLang="en-US"/>
           </a:p>
@@ -1450,7 +1461,7 @@
     </p:spTree>
     <p:extLst>
       <p:ext uri="{BB962C8B-B14F-4D97-AF65-F5344CB8AC3E}">
-        <p14:creationId xmlns:p14="http://schemas.microsoft.com/office/powerpoint/2010/main" val="1952986246"/>
+        <p14:creationId xmlns:p14="http://schemas.microsoft.com/office/powerpoint/2010/main" val="2033054096"/>
       </p:ext>
     </p:extLst>
   </p:cSld>
@@ -1489,8 +1500,8 @@
         </p:nvSpPr>
         <p:spPr>
           <a:xfrm>
-            <a:off x="472381" y="486836"/>
-            <a:ext cx="5915025" cy="1767417"/>
+            <a:off x="629841" y="365126"/>
+            <a:ext cx="7886700" cy="1325563"/>
           </a:xfrm>
         </p:spPr>
         <p:txBody>
@@ -1517,8 +1528,8 @@
         </p:nvSpPr>
         <p:spPr>
           <a:xfrm>
-            <a:off x="472381" y="2241551"/>
-            <a:ext cx="2901255" cy="1098549"/>
+            <a:off x="629842" y="1681163"/>
+            <a:ext cx="3868340" cy="823912"/>
           </a:xfrm>
         </p:spPr>
         <p:txBody>
@@ -1526,39 +1537,39 @@
           <a:lstStyle>
             <a:lvl1pPr marL="0" indent="0">
               <a:buNone/>
+              <a:defRPr sz="2400" b="1"/>
+            </a:lvl1pPr>
+            <a:lvl2pPr marL="457200" indent="0">
+              <a:buNone/>
+              <a:defRPr sz="2000" b="1"/>
+            </a:lvl2pPr>
+            <a:lvl3pPr marL="914400" indent="0">
+              <a:buNone/>
               <a:defRPr sz="1800" b="1"/>
-            </a:lvl1pPr>
-            <a:lvl2pPr marL="342900" indent="0">
-              <a:buNone/>
-              <a:defRPr sz="1500" b="1"/>
-            </a:lvl2pPr>
-            <a:lvl3pPr marL="685800" indent="0">
-              <a:buNone/>
-              <a:defRPr sz="1350" b="1"/>
             </a:lvl3pPr>
-            <a:lvl4pPr marL="1028700" indent="0">
-              <a:buNone/>
-              <a:defRPr sz="1200" b="1"/>
+            <a:lvl4pPr marL="1371600" indent="0">
+              <a:buNone/>
+              <a:defRPr sz="1600" b="1"/>
             </a:lvl4pPr>
-            <a:lvl5pPr marL="1371600" indent="0">
-              <a:buNone/>
-              <a:defRPr sz="1200" b="1"/>
+            <a:lvl5pPr marL="1828800" indent="0">
+              <a:buNone/>
+              <a:defRPr sz="1600" b="1"/>
             </a:lvl5pPr>
-            <a:lvl6pPr marL="1714500" indent="0">
-              <a:buNone/>
-              <a:defRPr sz="1200" b="1"/>
+            <a:lvl6pPr marL="2286000" indent="0">
+              <a:buNone/>
+              <a:defRPr sz="1600" b="1"/>
             </a:lvl6pPr>
-            <a:lvl7pPr marL="2057400" indent="0">
-              <a:buNone/>
-              <a:defRPr sz="1200" b="1"/>
+            <a:lvl7pPr marL="2743200" indent="0">
+              <a:buNone/>
+              <a:defRPr sz="1600" b="1"/>
             </a:lvl7pPr>
-            <a:lvl8pPr marL="2400300" indent="0">
-              <a:buNone/>
-              <a:defRPr sz="1200" b="1"/>
+            <a:lvl8pPr marL="3200400" indent="0">
+              <a:buNone/>
+              <a:defRPr sz="1600" b="1"/>
             </a:lvl8pPr>
-            <a:lvl9pPr marL="2743200" indent="0">
-              <a:buNone/>
-              <a:defRPr sz="1200" b="1"/>
+            <a:lvl9pPr marL="3657600" indent="0">
+              <a:buNone/>
+              <a:defRPr sz="1600" b="1"/>
             </a:lvl9pPr>
           </a:lstStyle>
           <a:p>
@@ -1582,8 +1593,8 @@
         </p:nvSpPr>
         <p:spPr>
           <a:xfrm>
-            <a:off x="472381" y="3340100"/>
-            <a:ext cx="2901255" cy="4912784"/>
+            <a:off x="629842" y="2505075"/>
+            <a:ext cx="3868340" cy="3684588"/>
           </a:xfrm>
         </p:spPr>
         <p:txBody>
@@ -1671,8 +1682,8 @@
         </p:nvSpPr>
         <p:spPr>
           <a:xfrm>
-            <a:off x="3471863" y="2241551"/>
-            <a:ext cx="2915543" cy="1098549"/>
+            <a:off x="4629150" y="1681163"/>
+            <a:ext cx="3887391" cy="823912"/>
           </a:xfrm>
         </p:spPr>
         <p:txBody>
@@ -1680,39 +1691,39 @@
           <a:lstStyle>
             <a:lvl1pPr marL="0" indent="0">
               <a:buNone/>
+              <a:defRPr sz="2400" b="1"/>
+            </a:lvl1pPr>
+            <a:lvl2pPr marL="457200" indent="0">
+              <a:buNone/>
+              <a:defRPr sz="2000" b="1"/>
+            </a:lvl2pPr>
+            <a:lvl3pPr marL="914400" indent="0">
+              <a:buNone/>
               <a:defRPr sz="1800" b="1"/>
-            </a:lvl1pPr>
-            <a:lvl2pPr marL="342900" indent="0">
-              <a:buNone/>
-              <a:defRPr sz="1500" b="1"/>
-            </a:lvl2pPr>
-            <a:lvl3pPr marL="685800" indent="0">
-              <a:buNone/>
-              <a:defRPr sz="1350" b="1"/>
             </a:lvl3pPr>
-            <a:lvl4pPr marL="1028700" indent="0">
-              <a:buNone/>
-              <a:defRPr sz="1200" b="1"/>
+            <a:lvl4pPr marL="1371600" indent="0">
+              <a:buNone/>
+              <a:defRPr sz="1600" b="1"/>
             </a:lvl4pPr>
-            <a:lvl5pPr marL="1371600" indent="0">
-              <a:buNone/>
-              <a:defRPr sz="1200" b="1"/>
+            <a:lvl5pPr marL="1828800" indent="0">
+              <a:buNone/>
+              <a:defRPr sz="1600" b="1"/>
             </a:lvl5pPr>
-            <a:lvl6pPr marL="1714500" indent="0">
-              <a:buNone/>
-              <a:defRPr sz="1200" b="1"/>
+            <a:lvl6pPr marL="2286000" indent="0">
+              <a:buNone/>
+              <a:defRPr sz="1600" b="1"/>
             </a:lvl6pPr>
-            <a:lvl7pPr marL="2057400" indent="0">
-              <a:buNone/>
-              <a:defRPr sz="1200" b="1"/>
+            <a:lvl7pPr marL="2743200" indent="0">
+              <a:buNone/>
+              <a:defRPr sz="1600" b="1"/>
             </a:lvl7pPr>
-            <a:lvl8pPr marL="2400300" indent="0">
-              <a:buNone/>
-              <a:defRPr sz="1200" b="1"/>
+            <a:lvl8pPr marL="3200400" indent="0">
+              <a:buNone/>
+              <a:defRPr sz="1600" b="1"/>
             </a:lvl8pPr>
-            <a:lvl9pPr marL="2743200" indent="0">
-              <a:buNone/>
-              <a:defRPr sz="1200" b="1"/>
+            <a:lvl9pPr marL="3657600" indent="0">
+              <a:buNone/>
+              <a:defRPr sz="1600" b="1"/>
             </a:lvl9pPr>
           </a:lstStyle>
           <a:p>
@@ -1736,8 +1747,8 @@
         </p:nvSpPr>
         <p:spPr>
           <a:xfrm>
-            <a:off x="3471863" y="3340100"/>
-            <a:ext cx="2915543" cy="4912784"/>
+            <a:off x="4629150" y="2505075"/>
+            <a:ext cx="3887391" cy="3684588"/>
           </a:xfrm>
         </p:spPr>
         <p:txBody>
@@ -1830,7 +1841,7 @@
           <a:p>
             <a:fld id="{DE3AD58E-45E1-4C59-9E64-AA667E6AFE1E}" type="datetimeFigureOut">
               <a:rPr kumimoji="1" lang="ja-JP" altLang="en-US" smtClean="0"/>
-              <a:t>2016/3/24</a:t>
+              <a:t>2016/5/2</a:t>
             </a:fld>
             <a:endParaRPr kumimoji="1" lang="ja-JP" altLang="en-US"/>
           </a:p>
@@ -1881,7 +1892,7 @@
     </p:spTree>
     <p:extLst>
       <p:ext uri="{BB962C8B-B14F-4D97-AF65-F5344CB8AC3E}">
-        <p14:creationId xmlns:p14="http://schemas.microsoft.com/office/powerpoint/2010/main" val="4015345637"/>
+        <p14:creationId xmlns:p14="http://schemas.microsoft.com/office/powerpoint/2010/main" val="927884055"/>
       </p:ext>
     </p:extLst>
   </p:cSld>
@@ -1948,7 +1959,7 @@
           <a:p>
             <a:fld id="{DE3AD58E-45E1-4C59-9E64-AA667E6AFE1E}" type="datetimeFigureOut">
               <a:rPr kumimoji="1" lang="ja-JP" altLang="en-US" smtClean="0"/>
-              <a:t>2016/3/24</a:t>
+              <a:t>2016/5/2</a:t>
             </a:fld>
             <a:endParaRPr kumimoji="1" lang="ja-JP" altLang="en-US"/>
           </a:p>
@@ -1999,7 +2010,7 @@
     </p:spTree>
     <p:extLst>
       <p:ext uri="{BB962C8B-B14F-4D97-AF65-F5344CB8AC3E}">
-        <p14:creationId xmlns:p14="http://schemas.microsoft.com/office/powerpoint/2010/main" val="188392045"/>
+        <p14:creationId xmlns:p14="http://schemas.microsoft.com/office/powerpoint/2010/main" val="2068551518"/>
       </p:ext>
     </p:extLst>
   </p:cSld>
@@ -2043,7 +2054,7 @@
           <a:p>
             <a:fld id="{DE3AD58E-45E1-4C59-9E64-AA667E6AFE1E}" type="datetimeFigureOut">
               <a:rPr kumimoji="1" lang="ja-JP" altLang="en-US" smtClean="0"/>
-              <a:t>2016/3/24</a:t>
+              <a:t>2016/5/2</a:t>
             </a:fld>
             <a:endParaRPr kumimoji="1" lang="ja-JP" altLang="en-US"/>
           </a:p>
@@ -2094,7 +2105,7 @@
     </p:spTree>
     <p:extLst>
       <p:ext uri="{BB962C8B-B14F-4D97-AF65-F5344CB8AC3E}">
-        <p14:creationId xmlns:p14="http://schemas.microsoft.com/office/powerpoint/2010/main" val="3820345424"/>
+        <p14:creationId xmlns:p14="http://schemas.microsoft.com/office/powerpoint/2010/main" val="532601743"/>
       </p:ext>
     </p:extLst>
   </p:cSld>
@@ -2133,15 +2144,15 @@
         </p:nvSpPr>
         <p:spPr>
           <a:xfrm>
-            <a:off x="472381" y="609600"/>
-            <a:ext cx="2211884" cy="2133600"/>
+            <a:off x="629841" y="457200"/>
+            <a:ext cx="2949178" cy="1600200"/>
           </a:xfrm>
         </p:spPr>
         <p:txBody>
           <a:bodyPr anchor="b"/>
           <a:lstStyle>
             <a:lvl1pPr>
-              <a:defRPr sz="2400"/>
+              <a:defRPr sz="3200"/>
             </a:lvl1pPr>
           </a:lstStyle>
           <a:p>
@@ -2165,39 +2176,39 @@
         </p:nvSpPr>
         <p:spPr>
           <a:xfrm>
-            <a:off x="2915543" y="1316569"/>
-            <a:ext cx="3471863" cy="6498167"/>
+            <a:off x="3887391" y="987426"/>
+            <a:ext cx="4629150" cy="4873625"/>
           </a:xfrm>
         </p:spPr>
         <p:txBody>
           <a:bodyPr/>
           <a:lstStyle>
             <a:lvl1pPr>
-              <a:defRPr sz="2400"/>
+              <a:defRPr sz="3200"/>
             </a:lvl1pPr>
             <a:lvl2pPr>
-              <a:defRPr sz="2100"/>
+              <a:defRPr sz="2800"/>
             </a:lvl2pPr>
             <a:lvl3pPr>
-              <a:defRPr sz="1800"/>
+              <a:defRPr sz="2400"/>
             </a:lvl3pPr>
             <a:lvl4pPr>
-              <a:defRPr sz="1500"/>
+              <a:defRPr sz="2000"/>
             </a:lvl4pPr>
             <a:lvl5pPr>
-              <a:defRPr sz="1500"/>
+              <a:defRPr sz="2000"/>
             </a:lvl5pPr>
             <a:lvl6pPr>
-              <a:defRPr sz="1500"/>
+              <a:defRPr sz="2000"/>
             </a:lvl6pPr>
             <a:lvl7pPr>
-              <a:defRPr sz="1500"/>
+              <a:defRPr sz="2000"/>
             </a:lvl7pPr>
             <a:lvl8pPr>
-              <a:defRPr sz="1500"/>
+              <a:defRPr sz="2000"/>
             </a:lvl8pPr>
             <a:lvl9pPr>
-              <a:defRPr sz="1500"/>
+              <a:defRPr sz="2000"/>
             </a:lvl9pPr>
           </a:lstStyle>
           <a:p>
@@ -2282,8 +2293,8 @@
         </p:nvSpPr>
         <p:spPr>
           <a:xfrm>
-            <a:off x="472381" y="2743200"/>
-            <a:ext cx="2211884" cy="5082117"/>
+            <a:off x="629841" y="2057400"/>
+            <a:ext cx="2949178" cy="3811588"/>
           </a:xfrm>
         </p:spPr>
         <p:txBody>
@@ -2291,39 +2302,39 @@
           <a:lstStyle>
             <a:lvl1pPr marL="0" indent="0">
               <a:buNone/>
+              <a:defRPr sz="1600"/>
+            </a:lvl1pPr>
+            <a:lvl2pPr marL="457200" indent="0">
+              <a:buNone/>
+              <a:defRPr sz="1400"/>
+            </a:lvl2pPr>
+            <a:lvl3pPr marL="914400" indent="0">
+              <a:buNone/>
               <a:defRPr sz="1200"/>
-            </a:lvl1pPr>
-            <a:lvl2pPr marL="342900" indent="0">
-              <a:buNone/>
-              <a:defRPr sz="1050"/>
-            </a:lvl2pPr>
-            <a:lvl3pPr marL="685800" indent="0">
-              <a:buNone/>
-              <a:defRPr sz="900"/>
             </a:lvl3pPr>
-            <a:lvl4pPr marL="1028700" indent="0">
-              <a:buNone/>
-              <a:defRPr sz="750"/>
+            <a:lvl4pPr marL="1371600" indent="0">
+              <a:buNone/>
+              <a:defRPr sz="1000"/>
             </a:lvl4pPr>
-            <a:lvl5pPr marL="1371600" indent="0">
-              <a:buNone/>
-              <a:defRPr sz="750"/>
+            <a:lvl5pPr marL="1828800" indent="0">
+              <a:buNone/>
+              <a:defRPr sz="1000"/>
             </a:lvl5pPr>
-            <a:lvl6pPr marL="1714500" indent="0">
-              <a:buNone/>
-              <a:defRPr sz="750"/>
+            <a:lvl6pPr marL="2286000" indent="0">
+              <a:buNone/>
+              <a:defRPr sz="1000"/>
             </a:lvl6pPr>
-            <a:lvl7pPr marL="2057400" indent="0">
-              <a:buNone/>
-              <a:defRPr sz="750"/>
+            <a:lvl7pPr marL="2743200" indent="0">
+              <a:buNone/>
+              <a:defRPr sz="1000"/>
             </a:lvl7pPr>
-            <a:lvl8pPr marL="2400300" indent="0">
-              <a:buNone/>
-              <a:defRPr sz="750"/>
+            <a:lvl8pPr marL="3200400" indent="0">
+              <a:buNone/>
+              <a:defRPr sz="1000"/>
             </a:lvl8pPr>
-            <a:lvl9pPr marL="2743200" indent="0">
-              <a:buNone/>
-              <a:defRPr sz="750"/>
+            <a:lvl9pPr marL="3657600" indent="0">
+              <a:buNone/>
+              <a:defRPr sz="1000"/>
             </a:lvl9pPr>
           </a:lstStyle>
           <a:p>
@@ -2352,7 +2363,7 @@
           <a:p>
             <a:fld id="{DE3AD58E-45E1-4C59-9E64-AA667E6AFE1E}" type="datetimeFigureOut">
               <a:rPr kumimoji="1" lang="ja-JP" altLang="en-US" smtClean="0"/>
-              <a:t>2016/3/24</a:t>
+              <a:t>2016/5/2</a:t>
             </a:fld>
             <a:endParaRPr kumimoji="1" lang="ja-JP" altLang="en-US"/>
           </a:p>
@@ -2403,7 +2414,7 @@
     </p:spTree>
     <p:extLst>
       <p:ext uri="{BB962C8B-B14F-4D97-AF65-F5344CB8AC3E}">
-        <p14:creationId xmlns:p14="http://schemas.microsoft.com/office/powerpoint/2010/main" val="4245288424"/>
+        <p14:creationId xmlns:p14="http://schemas.microsoft.com/office/powerpoint/2010/main" val="725653905"/>
       </p:ext>
     </p:extLst>
   </p:cSld>
@@ -2442,15 +2453,15 @@
         </p:nvSpPr>
         <p:spPr>
           <a:xfrm>
-            <a:off x="472381" y="609600"/>
-            <a:ext cx="2211884" cy="2133600"/>
+            <a:off x="629841" y="457200"/>
+            <a:ext cx="2949178" cy="1600200"/>
           </a:xfrm>
         </p:spPr>
         <p:txBody>
           <a:bodyPr anchor="b"/>
           <a:lstStyle>
             <a:lvl1pPr>
-              <a:defRPr sz="2400"/>
+              <a:defRPr sz="3200"/>
             </a:lvl1pPr>
           </a:lstStyle>
           <a:p>
@@ -2474,8 +2485,8 @@
         </p:nvSpPr>
         <p:spPr>
           <a:xfrm>
-            <a:off x="2915543" y="1316569"/>
-            <a:ext cx="3471863" cy="6498167"/>
+            <a:off x="3887391" y="987426"/>
+            <a:ext cx="4629150" cy="4873625"/>
           </a:xfrm>
         </p:spPr>
         <p:txBody>
@@ -2483,45 +2494,45 @@
           <a:lstStyle>
             <a:lvl1pPr marL="0" indent="0">
               <a:buNone/>
+              <a:defRPr sz="3200"/>
+            </a:lvl1pPr>
+            <a:lvl2pPr marL="457200" indent="0">
+              <a:buNone/>
+              <a:defRPr sz="2800"/>
+            </a:lvl2pPr>
+            <a:lvl3pPr marL="914400" indent="0">
+              <a:buNone/>
               <a:defRPr sz="2400"/>
-            </a:lvl1pPr>
-            <a:lvl2pPr marL="342900" indent="0">
-              <a:buNone/>
-              <a:defRPr sz="2100"/>
-            </a:lvl2pPr>
-            <a:lvl3pPr marL="685800" indent="0">
-              <a:buNone/>
-              <a:defRPr sz="1800"/>
             </a:lvl3pPr>
-            <a:lvl4pPr marL="1028700" indent="0">
-              <a:buNone/>
-              <a:defRPr sz="1500"/>
+            <a:lvl4pPr marL="1371600" indent="0">
+              <a:buNone/>
+              <a:defRPr sz="2000"/>
             </a:lvl4pPr>
-            <a:lvl5pPr marL="1371600" indent="0">
-              <a:buNone/>
-              <a:defRPr sz="1500"/>
+            <a:lvl5pPr marL="1828800" indent="0">
+              <a:buNone/>
+              <a:defRPr sz="2000"/>
             </a:lvl5pPr>
-            <a:lvl6pPr marL="1714500" indent="0">
-              <a:buNone/>
-              <a:defRPr sz="1500"/>
+            <a:lvl6pPr marL="2286000" indent="0">
+              <a:buNone/>
+              <a:defRPr sz="2000"/>
             </a:lvl6pPr>
-            <a:lvl7pPr marL="2057400" indent="0">
-              <a:buNone/>
-              <a:defRPr sz="1500"/>
+            <a:lvl7pPr marL="2743200" indent="0">
+              <a:buNone/>
+              <a:defRPr sz="2000"/>
             </a:lvl7pPr>
-            <a:lvl8pPr marL="2400300" indent="0">
-              <a:buNone/>
-              <a:defRPr sz="1500"/>
+            <a:lvl8pPr marL="3200400" indent="0">
+              <a:buNone/>
+              <a:defRPr sz="2000"/>
             </a:lvl8pPr>
-            <a:lvl9pPr marL="2743200" indent="0">
-              <a:buNone/>
-              <a:defRPr sz="1500"/>
+            <a:lvl9pPr marL="3657600" indent="0">
+              <a:buNone/>
+              <a:defRPr sz="2000"/>
             </a:lvl9pPr>
           </a:lstStyle>
           <a:p>
             <a:r>
               <a:rPr lang="ja-JP" altLang="en-US" smtClean="0"/>
-              <a:t>図を追加</a:t>
+              <a:t>プレースホルダーまでドラッグするかアイコンをクリックして図を追加</a:t>
             </a:r>
             <a:endParaRPr lang="en-US" dirty="0"/>
           </a:p>
@@ -2539,8 +2550,8 @@
         </p:nvSpPr>
         <p:spPr>
           <a:xfrm>
-            <a:off x="472381" y="2743200"/>
-            <a:ext cx="2211884" cy="5082117"/>
+            <a:off x="629841" y="2057400"/>
+            <a:ext cx="2949178" cy="3811588"/>
           </a:xfrm>
         </p:spPr>
         <p:txBody>
@@ -2548,39 +2559,39 @@
           <a:lstStyle>
             <a:lvl1pPr marL="0" indent="0">
               <a:buNone/>
+              <a:defRPr sz="1600"/>
+            </a:lvl1pPr>
+            <a:lvl2pPr marL="457200" indent="0">
+              <a:buNone/>
+              <a:defRPr sz="1400"/>
+            </a:lvl2pPr>
+            <a:lvl3pPr marL="914400" indent="0">
+              <a:buNone/>
               <a:defRPr sz="1200"/>
-            </a:lvl1pPr>
-            <a:lvl2pPr marL="342900" indent="0">
-              <a:buNone/>
-              <a:defRPr sz="1050"/>
-            </a:lvl2pPr>
-            <a:lvl3pPr marL="685800" indent="0">
-              <a:buNone/>
-              <a:defRPr sz="900"/>
             </a:lvl3pPr>
-            <a:lvl4pPr marL="1028700" indent="0">
-              <a:buNone/>
-              <a:defRPr sz="750"/>
+            <a:lvl4pPr marL="1371600" indent="0">
+              <a:buNone/>
+              <a:defRPr sz="1000"/>
             </a:lvl4pPr>
-            <a:lvl5pPr marL="1371600" indent="0">
-              <a:buNone/>
-              <a:defRPr sz="750"/>
+            <a:lvl5pPr marL="1828800" indent="0">
+              <a:buNone/>
+              <a:defRPr sz="1000"/>
             </a:lvl5pPr>
-            <a:lvl6pPr marL="1714500" indent="0">
-              <a:buNone/>
-              <a:defRPr sz="750"/>
+            <a:lvl6pPr marL="2286000" indent="0">
+              <a:buNone/>
+              <a:defRPr sz="1000"/>
             </a:lvl6pPr>
-            <a:lvl7pPr marL="2057400" indent="0">
-              <a:buNone/>
-              <a:defRPr sz="750"/>
+            <a:lvl7pPr marL="2743200" indent="0">
+              <a:buNone/>
+              <a:defRPr sz="1000"/>
             </a:lvl7pPr>
-            <a:lvl8pPr marL="2400300" indent="0">
-              <a:buNone/>
-              <a:defRPr sz="750"/>
+            <a:lvl8pPr marL="3200400" indent="0">
+              <a:buNone/>
+              <a:defRPr sz="1000"/>
             </a:lvl8pPr>
-            <a:lvl9pPr marL="2743200" indent="0">
-              <a:buNone/>
-              <a:defRPr sz="750"/>
+            <a:lvl9pPr marL="3657600" indent="0">
+              <a:buNone/>
+              <a:defRPr sz="1000"/>
             </a:lvl9pPr>
           </a:lstStyle>
           <a:p>
@@ -2609,7 +2620,7 @@
           <a:p>
             <a:fld id="{DE3AD58E-45E1-4C59-9E64-AA667E6AFE1E}" type="datetimeFigureOut">
               <a:rPr kumimoji="1" lang="ja-JP" altLang="en-US" smtClean="0"/>
-              <a:t>2016/3/24</a:t>
+              <a:t>2016/5/2</a:t>
             </a:fld>
             <a:endParaRPr kumimoji="1" lang="ja-JP" altLang="en-US"/>
           </a:p>
@@ -2660,7 +2671,7 @@
     </p:spTree>
     <p:extLst>
       <p:ext uri="{BB962C8B-B14F-4D97-AF65-F5344CB8AC3E}">
-        <p14:creationId xmlns:p14="http://schemas.microsoft.com/office/powerpoint/2010/main" val="1810296144"/>
+        <p14:creationId xmlns:p14="http://schemas.microsoft.com/office/powerpoint/2010/main" val="505550022"/>
       </p:ext>
     </p:extLst>
   </p:cSld>
@@ -2704,8 +2715,8 @@
         </p:nvSpPr>
         <p:spPr>
           <a:xfrm>
-            <a:off x="471488" y="486836"/>
-            <a:ext cx="5915025" cy="1767417"/>
+            <a:off x="628650" y="365126"/>
+            <a:ext cx="7886700" cy="1325563"/>
           </a:xfrm>
           <a:prstGeom prst="rect">
             <a:avLst/>
@@ -2737,8 +2748,8 @@
         </p:nvSpPr>
         <p:spPr>
           <a:xfrm>
-            <a:off x="471488" y="2434167"/>
-            <a:ext cx="5915025" cy="5801784"/>
+            <a:off x="628650" y="1825625"/>
+            <a:ext cx="7886700" cy="4351338"/>
           </a:xfrm>
           <a:prstGeom prst="rect">
             <a:avLst/>
@@ -2831,8 +2842,8 @@
         </p:nvSpPr>
         <p:spPr>
           <a:xfrm>
-            <a:off x="471488" y="8475136"/>
-            <a:ext cx="1543050" cy="486833"/>
+            <a:off x="628650" y="6356351"/>
+            <a:ext cx="2057400" cy="365125"/>
           </a:xfrm>
           <a:prstGeom prst="rect">
             <a:avLst/>
@@ -2842,7 +2853,7 @@
           <a:bodyPr vert="horz" lIns="91440" tIns="45720" rIns="91440" bIns="45720" rtlCol="0" anchor="ctr"/>
           <a:lstStyle>
             <a:lvl1pPr algn="l">
-              <a:defRPr sz="900">
+              <a:defRPr sz="1200">
                 <a:solidFill>
                   <a:schemeClr val="tx1">
                     <a:tint val="75000"/>
@@ -2854,7 +2865,7 @@
           <a:p>
             <a:fld id="{DE3AD58E-45E1-4C59-9E64-AA667E6AFE1E}" type="datetimeFigureOut">
               <a:rPr kumimoji="1" lang="ja-JP" altLang="en-US" smtClean="0"/>
-              <a:t>2016/3/24</a:t>
+              <a:t>2016/5/2</a:t>
             </a:fld>
             <a:endParaRPr kumimoji="1" lang="ja-JP" altLang="en-US"/>
           </a:p>
@@ -2872,8 +2883,8 @@
         </p:nvSpPr>
         <p:spPr>
           <a:xfrm>
-            <a:off x="2271713" y="8475136"/>
-            <a:ext cx="2314575" cy="486833"/>
+            <a:off x="3028950" y="6356351"/>
+            <a:ext cx="3086100" cy="365125"/>
           </a:xfrm>
           <a:prstGeom prst="rect">
             <a:avLst/>
@@ -2883,7 +2894,7 @@
           <a:bodyPr vert="horz" lIns="91440" tIns="45720" rIns="91440" bIns="45720" rtlCol="0" anchor="ctr"/>
           <a:lstStyle>
             <a:lvl1pPr algn="ctr">
-              <a:defRPr sz="900">
+              <a:defRPr sz="1200">
                 <a:solidFill>
                   <a:schemeClr val="tx1">
                     <a:tint val="75000"/>
@@ -2909,8 +2920,8 @@
         </p:nvSpPr>
         <p:spPr>
           <a:xfrm>
-            <a:off x="4843463" y="8475136"/>
-            <a:ext cx="1543050" cy="486833"/>
+            <a:off x="6457950" y="6356351"/>
+            <a:ext cx="2057400" cy="365125"/>
           </a:xfrm>
           <a:prstGeom prst="rect">
             <a:avLst/>
@@ -2920,7 +2931,7 @@
           <a:bodyPr vert="horz" lIns="91440" tIns="45720" rIns="91440" bIns="45720" rtlCol="0" anchor="ctr"/>
           <a:lstStyle>
             <a:lvl1pPr algn="r">
-              <a:defRPr sz="900">
+              <a:defRPr sz="1200">
                 <a:solidFill>
                   <a:schemeClr val="tx1">
                     <a:tint val="75000"/>
@@ -2941,27 +2952,27 @@
     </p:spTree>
     <p:extLst>
       <p:ext uri="{BB962C8B-B14F-4D97-AF65-F5344CB8AC3E}">
-        <p14:creationId xmlns:p14="http://schemas.microsoft.com/office/powerpoint/2010/main" val="4132394014"/>
+        <p14:creationId xmlns:p14="http://schemas.microsoft.com/office/powerpoint/2010/main" val="1481920884"/>
       </p:ext>
     </p:extLst>
   </p:cSld>
   <p:clrMap bg1="lt1" tx1="dk1" bg2="lt2" tx2="dk2" accent1="accent1" accent2="accent2" accent3="accent3" accent4="accent4" accent5="accent5" accent6="accent6" hlink="hlink" folHlink="folHlink"/>
   <p:sldLayoutIdLst>
-    <p:sldLayoutId id="2147483661" r:id="rId1"/>
-    <p:sldLayoutId id="2147483662" r:id="rId2"/>
-    <p:sldLayoutId id="2147483663" r:id="rId3"/>
-    <p:sldLayoutId id="2147483664" r:id="rId4"/>
-    <p:sldLayoutId id="2147483665" r:id="rId5"/>
-    <p:sldLayoutId id="2147483666" r:id="rId6"/>
-    <p:sldLayoutId id="2147483667" r:id="rId7"/>
-    <p:sldLayoutId id="2147483668" r:id="rId8"/>
-    <p:sldLayoutId id="2147483669" r:id="rId9"/>
-    <p:sldLayoutId id="2147483670" r:id="rId10"/>
-    <p:sldLayoutId id="2147483671" r:id="rId11"/>
+    <p:sldLayoutId id="2147483697" r:id="rId1"/>
+    <p:sldLayoutId id="2147483698" r:id="rId2"/>
+    <p:sldLayoutId id="2147483699" r:id="rId3"/>
+    <p:sldLayoutId id="2147483700" r:id="rId4"/>
+    <p:sldLayoutId id="2147483701" r:id="rId5"/>
+    <p:sldLayoutId id="2147483702" r:id="rId6"/>
+    <p:sldLayoutId id="2147483703" r:id="rId7"/>
+    <p:sldLayoutId id="2147483704" r:id="rId8"/>
+    <p:sldLayoutId id="2147483705" r:id="rId9"/>
+    <p:sldLayoutId id="2147483706" r:id="rId10"/>
+    <p:sldLayoutId id="2147483707" r:id="rId11"/>
   </p:sldLayoutIdLst>
   <p:txStyles>
     <p:titleStyle>
-      <a:lvl1pPr algn="l" defTabSz="685800" rtl="0" eaLnBrk="1" latinLnBrk="0" hangingPunct="1">
+      <a:lvl1pPr algn="l" defTabSz="914400" rtl="0" eaLnBrk="1" latinLnBrk="0" hangingPunct="1">
         <a:lnSpc>
           <a:spcPct val="90000"/>
         </a:lnSpc>
@@ -2969,7 +2980,7 @@
           <a:spcPct val="0"/>
         </a:spcBef>
         <a:buNone/>
-        <a:defRPr kumimoji="1" sz="3300" kern="1200">
+        <a:defRPr kumimoji="1" sz="4400" kern="1200">
           <a:solidFill>
             <a:schemeClr val="tx1"/>
           </a:solidFill>
@@ -2980,16 +2991,16 @@
       </a:lvl1pPr>
     </p:titleStyle>
     <p:bodyStyle>
-      <a:lvl1pPr marL="171450" indent="-171450" algn="l" defTabSz="685800" rtl="0" eaLnBrk="1" latinLnBrk="0" hangingPunct="1">
+      <a:lvl1pPr marL="228600" indent="-228600" algn="l" defTabSz="914400" rtl="0" eaLnBrk="1" latinLnBrk="0" hangingPunct="1">
         <a:lnSpc>
           <a:spcPct val="90000"/>
         </a:lnSpc>
         <a:spcBef>
-          <a:spcPts val="750"/>
+          <a:spcPts val="1000"/>
         </a:spcBef>
         <a:buFont typeface="Arial" panose="020B0604020202020204" pitchFamily="34" charset="0"/>
         <a:buChar char="•"/>
-        <a:defRPr kumimoji="1" sz="2100" kern="1200">
+        <a:defRPr kumimoji="1" sz="2800" kern="1200">
           <a:solidFill>
             <a:schemeClr val="tx1"/>
           </a:solidFill>
@@ -2998,12 +3009,48 @@
           <a:cs typeface="+mn-cs"/>
         </a:defRPr>
       </a:lvl1pPr>
-      <a:lvl2pPr marL="514350" indent="-171450" algn="l" defTabSz="685800" rtl="0" eaLnBrk="1" latinLnBrk="0" hangingPunct="1">
+      <a:lvl2pPr marL="685800" indent="-228600" algn="l" defTabSz="914400" rtl="0" eaLnBrk="1" latinLnBrk="0" hangingPunct="1">
         <a:lnSpc>
           <a:spcPct val="90000"/>
         </a:lnSpc>
         <a:spcBef>
-          <a:spcPts val="375"/>
+          <a:spcPts val="500"/>
+        </a:spcBef>
+        <a:buFont typeface="Arial" panose="020B0604020202020204" pitchFamily="34" charset="0"/>
+        <a:buChar char="•"/>
+        <a:defRPr kumimoji="1" sz="2400" kern="1200">
+          <a:solidFill>
+            <a:schemeClr val="tx1"/>
+          </a:solidFill>
+          <a:latin typeface="+mn-lt"/>
+          <a:ea typeface="+mn-ea"/>
+          <a:cs typeface="+mn-cs"/>
+        </a:defRPr>
+      </a:lvl2pPr>
+      <a:lvl3pPr marL="1143000" indent="-228600" algn="l" defTabSz="914400" rtl="0" eaLnBrk="1" latinLnBrk="0" hangingPunct="1">
+        <a:lnSpc>
+          <a:spcPct val="90000"/>
+        </a:lnSpc>
+        <a:spcBef>
+          <a:spcPts val="500"/>
+        </a:spcBef>
+        <a:buFont typeface="Arial" panose="020B0604020202020204" pitchFamily="34" charset="0"/>
+        <a:buChar char="•"/>
+        <a:defRPr kumimoji="1" sz="2000" kern="1200">
+          <a:solidFill>
+            <a:schemeClr val="tx1"/>
+          </a:solidFill>
+          <a:latin typeface="+mn-lt"/>
+          <a:ea typeface="+mn-ea"/>
+          <a:cs typeface="+mn-cs"/>
+        </a:defRPr>
+      </a:lvl3pPr>
+      <a:lvl4pPr marL="1600200" indent="-228600" algn="l" defTabSz="914400" rtl="0" eaLnBrk="1" latinLnBrk="0" hangingPunct="1">
+        <a:lnSpc>
+          <a:spcPct val="90000"/>
+        </a:lnSpc>
+        <a:spcBef>
+          <a:spcPts val="500"/>
         </a:spcBef>
         <a:buFont typeface="Arial" panose="020B0604020202020204" pitchFamily="34" charset="0"/>
         <a:buChar char="•"/>
@@ -3015,53 +3062,17 @@
           <a:ea typeface="+mn-ea"/>
           <a:cs typeface="+mn-cs"/>
         </a:defRPr>
-      </a:lvl2pPr>
-      <a:lvl3pPr marL="857250" indent="-171450" algn="l" defTabSz="685800" rtl="0" eaLnBrk="1" latinLnBrk="0" hangingPunct="1">
+      </a:lvl4pPr>
+      <a:lvl5pPr marL="2057400" indent="-228600" algn="l" defTabSz="914400" rtl="0" eaLnBrk="1" latinLnBrk="0" hangingPunct="1">
         <a:lnSpc>
           <a:spcPct val="90000"/>
         </a:lnSpc>
         <a:spcBef>
-          <a:spcPts val="375"/>
+          <a:spcPts val="500"/>
         </a:spcBef>
         <a:buFont typeface="Arial" panose="020B0604020202020204" pitchFamily="34" charset="0"/>
         <a:buChar char="•"/>
-        <a:defRPr kumimoji="1" sz="1500" kern="1200">
-          <a:solidFill>
-            <a:schemeClr val="tx1"/>
-          </a:solidFill>
-          <a:latin typeface="+mn-lt"/>
-          <a:ea typeface="+mn-ea"/>
-          <a:cs typeface="+mn-cs"/>
-        </a:defRPr>
-      </a:lvl3pPr>
-      <a:lvl4pPr marL="1200150" indent="-171450" algn="l" defTabSz="685800" rtl="0" eaLnBrk="1" latinLnBrk="0" hangingPunct="1">
-        <a:lnSpc>
-          <a:spcPct val="90000"/>
-        </a:lnSpc>
-        <a:spcBef>
-          <a:spcPts val="375"/>
-        </a:spcBef>
-        <a:buFont typeface="Arial" panose="020B0604020202020204" pitchFamily="34" charset="0"/>
-        <a:buChar char="•"/>
-        <a:defRPr kumimoji="1" sz="1350" kern="1200">
-          <a:solidFill>
-            <a:schemeClr val="tx1"/>
-          </a:solidFill>
-          <a:latin typeface="+mn-lt"/>
-          <a:ea typeface="+mn-ea"/>
-          <a:cs typeface="+mn-cs"/>
-        </a:defRPr>
-      </a:lvl4pPr>
-      <a:lvl5pPr marL="1543050" indent="-171450" algn="l" defTabSz="685800" rtl="0" eaLnBrk="1" latinLnBrk="0" hangingPunct="1">
-        <a:lnSpc>
-          <a:spcPct val="90000"/>
-        </a:lnSpc>
-        <a:spcBef>
-          <a:spcPts val="375"/>
-        </a:spcBef>
-        <a:buFont typeface="Arial" panose="020B0604020202020204" pitchFamily="34" charset="0"/>
-        <a:buChar char="•"/>
-        <a:defRPr kumimoji="1" sz="1350" kern="1200">
+        <a:defRPr kumimoji="1" sz="1800" kern="1200">
           <a:solidFill>
             <a:schemeClr val="tx1"/>
           </a:solidFill>
@@ -3070,16 +3081,16 @@
           <a:cs typeface="+mn-cs"/>
         </a:defRPr>
       </a:lvl5pPr>
-      <a:lvl6pPr marL="1885950" indent="-171450" algn="l" defTabSz="685800" rtl="0" eaLnBrk="1" latinLnBrk="0" hangingPunct="1">
+      <a:lvl6pPr marL="2514600" indent="-228600" algn="l" defTabSz="914400" rtl="0" eaLnBrk="1" latinLnBrk="0" hangingPunct="1">
         <a:lnSpc>
           <a:spcPct val="90000"/>
         </a:lnSpc>
         <a:spcBef>
-          <a:spcPts val="375"/>
+          <a:spcPts val="500"/>
         </a:spcBef>
         <a:buFont typeface="Arial" panose="020B0604020202020204" pitchFamily="34" charset="0"/>
         <a:buChar char="•"/>
-        <a:defRPr kumimoji="1" sz="1350" kern="1200">
+        <a:defRPr kumimoji="1" sz="1800" kern="1200">
           <a:solidFill>
             <a:schemeClr val="tx1"/>
           </a:solidFill>
@@ -3088,16 +3099,16 @@
           <a:cs typeface="+mn-cs"/>
         </a:defRPr>
       </a:lvl6pPr>
-      <a:lvl7pPr marL="2228850" indent="-171450" algn="l" defTabSz="685800" rtl="0" eaLnBrk="1" latinLnBrk="0" hangingPunct="1">
+      <a:lvl7pPr marL="2971800" indent="-228600" algn="l" defTabSz="914400" rtl="0" eaLnBrk="1" latinLnBrk="0" hangingPunct="1">
         <a:lnSpc>
           <a:spcPct val="90000"/>
         </a:lnSpc>
         <a:spcBef>
-          <a:spcPts val="375"/>
+          <a:spcPts val="500"/>
         </a:spcBef>
         <a:buFont typeface="Arial" panose="020B0604020202020204" pitchFamily="34" charset="0"/>
         <a:buChar char="•"/>
-        <a:defRPr kumimoji="1" sz="1350" kern="1200">
+        <a:defRPr kumimoji="1" sz="1800" kern="1200">
           <a:solidFill>
             <a:schemeClr val="tx1"/>
           </a:solidFill>
@@ -3106,16 +3117,16 @@
           <a:cs typeface="+mn-cs"/>
         </a:defRPr>
       </a:lvl7pPr>
-      <a:lvl8pPr marL="2571750" indent="-171450" algn="l" defTabSz="685800" rtl="0" eaLnBrk="1" latinLnBrk="0" hangingPunct="1">
+      <a:lvl8pPr marL="3429000" indent="-228600" algn="l" defTabSz="914400" rtl="0" eaLnBrk="1" latinLnBrk="0" hangingPunct="1">
         <a:lnSpc>
           <a:spcPct val="90000"/>
         </a:lnSpc>
         <a:spcBef>
-          <a:spcPts val="375"/>
+          <a:spcPts val="500"/>
         </a:spcBef>
         <a:buFont typeface="Arial" panose="020B0604020202020204" pitchFamily="34" charset="0"/>
         <a:buChar char="•"/>
-        <a:defRPr kumimoji="1" sz="1350" kern="1200">
+        <a:defRPr kumimoji="1" sz="1800" kern="1200">
           <a:solidFill>
             <a:schemeClr val="tx1"/>
           </a:solidFill>
@@ -3124,16 +3135,16 @@
           <a:cs typeface="+mn-cs"/>
         </a:defRPr>
       </a:lvl8pPr>
-      <a:lvl9pPr marL="2914650" indent="-171450" algn="l" defTabSz="685800" rtl="0" eaLnBrk="1" latinLnBrk="0" hangingPunct="1">
+      <a:lvl9pPr marL="3886200" indent="-228600" algn="l" defTabSz="914400" rtl="0" eaLnBrk="1" latinLnBrk="0" hangingPunct="1">
         <a:lnSpc>
           <a:spcPct val="90000"/>
         </a:lnSpc>
         <a:spcBef>
-          <a:spcPts val="375"/>
+          <a:spcPts val="500"/>
         </a:spcBef>
         <a:buFont typeface="Arial" panose="020B0604020202020204" pitchFamily="34" charset="0"/>
         <a:buChar char="•"/>
-        <a:defRPr kumimoji="1" sz="1350" kern="1200">
+        <a:defRPr kumimoji="1" sz="1800" kern="1200">
           <a:solidFill>
             <a:schemeClr val="tx1"/>
           </a:solidFill>
@@ -3147,8 +3158,8 @@
       <a:defPPr>
         <a:defRPr lang="en-US"/>
       </a:defPPr>
-      <a:lvl1pPr marL="0" algn="l" defTabSz="685800" rtl="0" eaLnBrk="1" latinLnBrk="0" hangingPunct="1">
-        <a:defRPr kumimoji="1" sz="1350" kern="1200">
+      <a:lvl1pPr marL="0" algn="l" defTabSz="914400" rtl="0" eaLnBrk="1" latinLnBrk="0" hangingPunct="1">
+        <a:defRPr kumimoji="1" sz="1800" kern="1200">
           <a:solidFill>
             <a:schemeClr val="tx1"/>
           </a:solidFill>
@@ -3157,8 +3168,8 @@
           <a:cs typeface="+mn-cs"/>
         </a:defRPr>
       </a:lvl1pPr>
-      <a:lvl2pPr marL="342900" algn="l" defTabSz="685800" rtl="0" eaLnBrk="1" latinLnBrk="0" hangingPunct="1">
-        <a:defRPr kumimoji="1" sz="1350" kern="1200">
+      <a:lvl2pPr marL="457200" algn="l" defTabSz="914400" rtl="0" eaLnBrk="1" latinLnBrk="0" hangingPunct="1">
+        <a:defRPr kumimoji="1" sz="1800" kern="1200">
           <a:solidFill>
             <a:schemeClr val="tx1"/>
           </a:solidFill>
@@ -3167,8 +3178,8 @@
           <a:cs typeface="+mn-cs"/>
         </a:defRPr>
       </a:lvl2pPr>
-      <a:lvl3pPr marL="685800" algn="l" defTabSz="685800" rtl="0" eaLnBrk="1" latinLnBrk="0" hangingPunct="1">
-        <a:defRPr kumimoji="1" sz="1350" kern="1200">
+      <a:lvl3pPr marL="914400" algn="l" defTabSz="914400" rtl="0" eaLnBrk="1" latinLnBrk="0" hangingPunct="1">
+        <a:defRPr kumimoji="1" sz="1800" kern="1200">
           <a:solidFill>
             <a:schemeClr val="tx1"/>
           </a:solidFill>
@@ -3177,8 +3188,8 @@
           <a:cs typeface="+mn-cs"/>
         </a:defRPr>
       </a:lvl3pPr>
-      <a:lvl4pPr marL="1028700" algn="l" defTabSz="685800" rtl="0" eaLnBrk="1" latinLnBrk="0" hangingPunct="1">
-        <a:defRPr kumimoji="1" sz="1350" kern="1200">
+      <a:lvl4pPr marL="1371600" algn="l" defTabSz="914400" rtl="0" eaLnBrk="1" latinLnBrk="0" hangingPunct="1">
+        <a:defRPr kumimoji="1" sz="1800" kern="1200">
           <a:solidFill>
             <a:schemeClr val="tx1"/>
           </a:solidFill>
@@ -3187,8 +3198,8 @@
           <a:cs typeface="+mn-cs"/>
         </a:defRPr>
       </a:lvl4pPr>
-      <a:lvl5pPr marL="1371600" algn="l" defTabSz="685800" rtl="0" eaLnBrk="1" latinLnBrk="0" hangingPunct="1">
-        <a:defRPr kumimoji="1" sz="1350" kern="1200">
+      <a:lvl5pPr marL="1828800" algn="l" defTabSz="914400" rtl="0" eaLnBrk="1" latinLnBrk="0" hangingPunct="1">
+        <a:defRPr kumimoji="1" sz="1800" kern="1200">
           <a:solidFill>
             <a:schemeClr val="tx1"/>
           </a:solidFill>
@@ -3197,8 +3208,8 @@
           <a:cs typeface="+mn-cs"/>
         </a:defRPr>
       </a:lvl5pPr>
-      <a:lvl6pPr marL="1714500" algn="l" defTabSz="685800" rtl="0" eaLnBrk="1" latinLnBrk="0" hangingPunct="1">
-        <a:defRPr kumimoji="1" sz="1350" kern="1200">
+      <a:lvl6pPr marL="2286000" algn="l" defTabSz="914400" rtl="0" eaLnBrk="1" latinLnBrk="0" hangingPunct="1">
+        <a:defRPr kumimoji="1" sz="1800" kern="1200">
           <a:solidFill>
             <a:schemeClr val="tx1"/>
           </a:solidFill>
@@ -3207,8 +3218,8 @@
           <a:cs typeface="+mn-cs"/>
         </a:defRPr>
       </a:lvl6pPr>
-      <a:lvl7pPr marL="2057400" algn="l" defTabSz="685800" rtl="0" eaLnBrk="1" latinLnBrk="0" hangingPunct="1">
-        <a:defRPr kumimoji="1" sz="1350" kern="1200">
+      <a:lvl7pPr marL="2743200" algn="l" defTabSz="914400" rtl="0" eaLnBrk="1" latinLnBrk="0" hangingPunct="1">
+        <a:defRPr kumimoji="1" sz="1800" kern="1200">
           <a:solidFill>
             <a:schemeClr val="tx1"/>
           </a:solidFill>
@@ -3217,8 +3228,8 @@
           <a:cs typeface="+mn-cs"/>
         </a:defRPr>
       </a:lvl7pPr>
-      <a:lvl8pPr marL="2400300" algn="l" defTabSz="685800" rtl="0" eaLnBrk="1" latinLnBrk="0" hangingPunct="1">
-        <a:defRPr kumimoji="1" sz="1350" kern="1200">
+      <a:lvl8pPr marL="3200400" algn="l" defTabSz="914400" rtl="0" eaLnBrk="1" latinLnBrk="0" hangingPunct="1">
+        <a:defRPr kumimoji="1" sz="1800" kern="1200">
           <a:solidFill>
             <a:schemeClr val="tx1"/>
           </a:solidFill>
@@ -3227,8 +3238,8 @@
           <a:cs typeface="+mn-cs"/>
         </a:defRPr>
       </a:lvl8pPr>
-      <a:lvl9pPr marL="2743200" algn="l" defTabSz="685800" rtl="0" eaLnBrk="1" latinLnBrk="0" hangingPunct="1">
-        <a:defRPr kumimoji="1" sz="1350" kern="1200">
+      <a:lvl9pPr marL="3657600" algn="l" defTabSz="914400" rtl="0" eaLnBrk="1" latinLnBrk="0" hangingPunct="1">
+        <a:defRPr kumimoji="1" sz="1800" kern="1200">
           <a:solidFill>
             <a:schemeClr val="tx1"/>
           </a:solidFill>
@@ -3267,26 +3278,35 @@
         </p:nvGrpSpPr>
         <p:grpSpPr>
           <a:xfrm>
-            <a:off x="974352" y="2732573"/>
+            <a:off x="2117352" y="1589573"/>
             <a:ext cx="3624542" cy="4305538"/>
-            <a:chOff x="151225" y="268942"/>
-            <a:chExt cx="6586533" cy="7824042"/>
+            <a:chOff x="151225" y="268939"/>
+            <a:chExt cx="6586533" cy="7824034"/>
           </a:xfrm>
         </p:grpSpPr>
         <p:sp>
           <p:nvSpPr>
-            <p:cNvPr id="4" name="正方形/長方形 3"/>
+            <p:cNvPr id="72" name="正方形/長方形 71"/>
             <p:cNvSpPr/>
             <p:nvPr/>
           </p:nvSpPr>
           <p:spPr>
             <a:xfrm>
-              <a:off x="151225" y="268942"/>
-              <a:ext cx="1049812" cy="468166"/>
+              <a:off x="204393" y="914397"/>
+              <a:ext cx="6533365" cy="3001381"/>
             </a:xfrm>
             <a:prstGeom prst="rect">
               <a:avLst/>
             </a:prstGeom>
+            <a:solidFill>
+              <a:schemeClr val="bg1"/>
+            </a:solidFill>
+            <a:ln w="12700">
+              <a:solidFill>
+                <a:schemeClr val="accent1"/>
+              </a:solidFill>
+            </a:ln>
+            <a:effectLst/>
           </p:spPr>
           <p:style>
             <a:lnRef idx="2">
@@ -3305,43 +3325,39 @@
             </a:fontRef>
           </p:style>
           <p:txBody>
-            <a:bodyPr rot="0" spcFirstLastPara="0" vertOverflow="overflow" horzOverflow="overflow" vert="horz" wrap="square" lIns="51435" tIns="25718" rIns="51435" bIns="25718" numCol="1" spcCol="0" rtlCol="0" fromWordArt="0" anchor="ctr" anchorCtr="0" forceAA="0" compatLnSpc="1">
-              <a:prstTxWarp prst="textNoShape">
-                <a:avLst/>
-              </a:prstTxWarp>
-              <a:noAutofit/>
-            </a:bodyPr>
+            <a:bodyPr rtlCol="0" anchor="ctr"/>
             <a:lstStyle/>
             <a:p>
               <a:pPr algn="ctr"/>
-              <a:r>
-                <a:rPr lang="en-US" altLang="ja-JP" sz="800" dirty="0"/>
-                <a:t>Your Application</a:t>
-              </a:r>
-              <a:endParaRPr lang="ja-JP" altLang="en-US" sz="800" dirty="0"/>
+              <a:endParaRPr lang="ja-JP" altLang="en-US" sz="600">
+                <a:latin typeface="Arial" charset="0"/>
+              </a:endParaRPr>
             </a:p>
           </p:txBody>
         </p:sp>
         <p:sp>
           <p:nvSpPr>
-            <p:cNvPr id="5" name="正方形/長方形 4"/>
+            <p:cNvPr id="73" name="メモ 72"/>
             <p:cNvSpPr/>
             <p:nvPr/>
           </p:nvSpPr>
           <p:spPr>
             <a:xfrm>
-              <a:off x="2198145" y="268942"/>
-              <a:ext cx="1049812" cy="468166"/>
+              <a:off x="204393" y="912985"/>
+              <a:ext cx="389309" cy="195776"/>
             </a:xfrm>
-            <a:prstGeom prst="rect">
+            <a:prstGeom prst="foldedCorner">
               <a:avLst/>
             </a:prstGeom>
-            <a:noFill/>
-            <a:ln w="38100">
+            <a:solidFill>
+              <a:schemeClr val="bg1"/>
+            </a:solidFill>
+            <a:ln>
               <a:solidFill>
-                <a:schemeClr val="accent2"/>
+                <a:schemeClr val="accent1"/>
               </a:solidFill>
             </a:ln>
+            <a:effectLst/>
           </p:spPr>
           <p:style>
             <a:lnRef idx="2">
@@ -3360,6 +3376,69 @@
             </a:fontRef>
           </p:style>
           <p:txBody>
+            <a:bodyPr lIns="0" tIns="0" rIns="0" bIns="0" rtlCol="0" anchor="ctr"/>
+            <a:lstStyle/>
+            <a:p>
+              <a:pPr algn="ctr"/>
+              <a:r>
+                <a:rPr lang="en-US" altLang="ja-JP" sz="600" dirty="0">
+                  <a:solidFill>
+                    <a:schemeClr val="accent5"/>
+                  </a:solidFill>
+                  <a:latin typeface="Arial" charset="0"/>
+                </a:rPr>
+                <a:t>loop</a:t>
+              </a:r>
+              <a:endParaRPr lang="ja-JP" altLang="en-US" sz="600" dirty="0">
+                <a:solidFill>
+                  <a:schemeClr val="accent5"/>
+                </a:solidFill>
+                <a:latin typeface="Arial" charset="0"/>
+              </a:endParaRPr>
+            </a:p>
+          </p:txBody>
+        </p:sp>
+        <p:sp>
+          <p:nvSpPr>
+            <p:cNvPr id="4" name="正方形/長方形 3"/>
+            <p:cNvSpPr/>
+            <p:nvPr/>
+          </p:nvSpPr>
+          <p:spPr>
+            <a:xfrm>
+              <a:off x="151225" y="268939"/>
+              <a:ext cx="1049811" cy="468166"/>
+            </a:xfrm>
+            <a:prstGeom prst="rect">
+              <a:avLst/>
+            </a:prstGeom>
+            <a:solidFill>
+              <a:schemeClr val="bg1"/>
+            </a:solidFill>
+            <a:ln w="9525"/>
+            <a:effectLst>
+              <a:outerShdw blurRad="50800" dist="76200" dir="2700000" algn="tl" rotWithShape="0">
+                <a:prstClr val="black">
+                  <a:alpha val="40000"/>
+                </a:prstClr>
+              </a:outerShdw>
+            </a:effectLst>
+          </p:spPr>
+          <p:style>
+            <a:lnRef idx="2">
+              <a:schemeClr val="dk1"/>
+            </a:lnRef>
+            <a:fillRef idx="1">
+              <a:schemeClr val="lt1"/>
+            </a:fillRef>
+            <a:effectRef idx="0">
+              <a:schemeClr val="dk1"/>
+            </a:effectRef>
+            <a:fontRef idx="minor">
+              <a:schemeClr val="dk1"/>
+            </a:fontRef>
+          </p:style>
+          <p:txBody>
             <a:bodyPr rot="0" spcFirstLastPara="0" vertOverflow="overflow" horzOverflow="overflow" vert="horz" wrap="square" lIns="51435" tIns="25718" rIns="51435" bIns="25718" numCol="1" spcCol="0" rtlCol="0" fromWordArt="0" anchor="ctr" anchorCtr="0" forceAA="0" compatLnSpc="1">
               <a:prstTxWarp prst="textNoShape">
                 <a:avLst/>
@@ -3370,47 +3449,55 @@
             <a:p>
               <a:pPr algn="ctr"/>
               <a:r>
-                <a:rPr lang="en-US" altLang="ja-JP" sz="800" dirty="0">
-                  <a:solidFill>
-                    <a:schemeClr val="accent2"/>
-                  </a:solidFill>
+                <a:rPr lang="en-US" altLang="ja-JP" sz="600" dirty="0">
+                  <a:latin typeface="Arial" charset="0"/>
                 </a:rPr>
-                <a:t>IoT Driver Insights</a:t>
+                <a:t>Your Application</a:t>
               </a:r>
-              <a:endParaRPr lang="ja-JP" altLang="en-US" sz="800" dirty="0">
-                <a:solidFill>
-                  <a:schemeClr val="accent2"/>
-                </a:solidFill>
+              <a:endParaRPr lang="ja-JP" altLang="en-US" sz="600" dirty="0">
+                <a:latin typeface="Arial" charset="0"/>
               </a:endParaRPr>
             </a:p>
           </p:txBody>
         </p:sp>
         <p:sp>
           <p:nvSpPr>
-            <p:cNvPr id="6" name="正方形/長方形 5"/>
+            <p:cNvPr id="5" name="正方形/長方形 4"/>
             <p:cNvSpPr/>
             <p:nvPr/>
           </p:nvSpPr>
           <p:spPr>
             <a:xfrm>
-              <a:off x="3991868" y="268942"/>
-              <a:ext cx="1049812" cy="468166"/>
+              <a:off x="2198146" y="268939"/>
+              <a:ext cx="1049811" cy="468166"/>
             </a:xfrm>
             <a:prstGeom prst="rect">
               <a:avLst/>
             </a:prstGeom>
+            <a:ln>
+              <a:solidFill>
+                <a:schemeClr val="accent5"/>
+              </a:solidFill>
+            </a:ln>
+            <a:effectLst>
+              <a:outerShdw blurRad="50800" dist="76200" dir="2700000" algn="tl" rotWithShape="0">
+                <a:prstClr val="black">
+                  <a:alpha val="40000"/>
+                </a:prstClr>
+              </a:outerShdw>
+            </a:effectLst>
           </p:spPr>
           <p:style>
             <a:lnRef idx="2">
-              <a:schemeClr val="accent1">
+              <a:schemeClr val="accent5">
                 <a:shade val="50000"/>
               </a:schemeClr>
             </a:lnRef>
             <a:fillRef idx="1">
-              <a:schemeClr val="accent1"/>
+              <a:schemeClr val="accent5"/>
             </a:fillRef>
             <a:effectRef idx="0">
-              <a:schemeClr val="accent1"/>
+              <a:schemeClr val="accent5"/>
             </a:effectRef>
             <a:fontRef idx="minor">
               <a:schemeClr val="lt1"/>
@@ -3427,23 +3514,99 @@
             <a:p>
               <a:pPr algn="ctr"/>
               <a:r>
-                <a:rPr lang="en-US" altLang="ja-JP" sz="800" dirty="0"/>
-                <a:t>IoT Map Insights</a:t>
+                <a:rPr lang="en-US" altLang="ja-JP" sz="600" dirty="0">
+                  <a:solidFill>
+                    <a:schemeClr val="bg1"/>
+                  </a:solidFill>
+                  <a:latin typeface="Arial" charset="0"/>
+                </a:rPr>
+                <a:t>IoT Driver Behavior</a:t>
               </a:r>
-              <a:endParaRPr lang="ja-JP" altLang="en-US" sz="800" dirty="0"/>
+              <a:endParaRPr lang="ja-JP" altLang="en-US" sz="600" dirty="0">
+                <a:solidFill>
+                  <a:schemeClr val="bg1"/>
+                </a:solidFill>
+                <a:latin typeface="Arial" charset="0"/>
+              </a:endParaRPr>
             </a:p>
           </p:txBody>
         </p:sp>
         <p:sp>
           <p:nvSpPr>
-            <p:cNvPr id="7" name="正方形/長方形 6"/>
+            <p:cNvPr id="6" name="正方形/長方形 5"/>
             <p:cNvSpPr/>
             <p:nvPr/>
           </p:nvSpPr>
           <p:spPr>
             <a:xfrm>
-              <a:off x="204393" y="7624818"/>
-              <a:ext cx="1049812" cy="468166"/>
+              <a:off x="3991868" y="268939"/>
+              <a:ext cx="1049811" cy="468166"/>
+            </a:xfrm>
+            <a:prstGeom prst="rect">
+              <a:avLst/>
+            </a:prstGeom>
+            <a:solidFill>
+              <a:srgbClr val="E5F2FF"/>
+            </a:solidFill>
+            <a:ln w="9525">
+              <a:solidFill>
+                <a:schemeClr val="accent5"/>
+              </a:solidFill>
+            </a:ln>
+            <a:effectLst>
+              <a:outerShdw blurRad="50800" dist="76200" dir="2700000" algn="tl" rotWithShape="0">
+                <a:prstClr val="black">
+                  <a:alpha val="40000"/>
+                </a:prstClr>
+              </a:outerShdw>
+            </a:effectLst>
+          </p:spPr>
+          <p:style>
+            <a:lnRef idx="2">
+              <a:schemeClr val="dk1"/>
+            </a:lnRef>
+            <a:fillRef idx="1">
+              <a:schemeClr val="lt1"/>
+            </a:fillRef>
+            <a:effectRef idx="0">
+              <a:schemeClr val="dk1"/>
+            </a:effectRef>
+            <a:fontRef idx="minor">
+              <a:schemeClr val="dk1"/>
+            </a:fontRef>
+          </p:style>
+          <p:txBody>
+            <a:bodyPr rot="0" spcFirstLastPara="0" vertOverflow="overflow" horzOverflow="overflow" vert="horz" wrap="square" lIns="51435" tIns="25718" rIns="51435" bIns="25718" numCol="1" spcCol="0" rtlCol="0" fromWordArt="0" anchor="ctr" anchorCtr="0" forceAA="0" compatLnSpc="1">
+              <a:prstTxWarp prst="textNoShape">
+                <a:avLst/>
+              </a:prstTxWarp>
+              <a:noAutofit/>
+            </a:bodyPr>
+            <a:lstStyle/>
+            <a:p>
+              <a:pPr algn="ctr"/>
+              <a:r>
+                <a:rPr lang="en-US" altLang="ja-JP" sz="600" dirty="0">
+                  <a:latin typeface="Arial" charset="0"/>
+                </a:rPr>
+                <a:t>IoT Context Mapping</a:t>
+              </a:r>
+              <a:endParaRPr lang="ja-JP" altLang="en-US" sz="600" dirty="0">
+                <a:latin typeface="Arial" charset="0"/>
+              </a:endParaRPr>
+            </a:p>
+          </p:txBody>
+        </p:sp>
+        <p:sp>
+          <p:nvSpPr>
+            <p:cNvPr id="8" name="正方形/長方形 7"/>
+            <p:cNvSpPr/>
+            <p:nvPr/>
+          </p:nvSpPr>
+          <p:spPr>
+            <a:xfrm>
+              <a:off x="2198146" y="7624807"/>
+              <a:ext cx="1049811" cy="468166"/>
             </a:xfrm>
             <a:prstGeom prst="rect">
               <a:avLst/>
@@ -3480,23 +3643,27 @@
             <a:p>
               <a:pPr algn="ctr"/>
               <a:r>
-                <a:rPr lang="en-US" altLang="ja-JP" sz="800" dirty="0"/>
-                <a:t>Your Application</a:t>
+                <a:rPr lang="en-US" altLang="ja-JP" sz="600" dirty="0">
+                  <a:latin typeface="Arial" charset="0"/>
+                </a:rPr>
+                <a:t>IoT Driver Insights</a:t>
               </a:r>
-              <a:endParaRPr lang="ja-JP" altLang="en-US" sz="800" dirty="0"/>
+              <a:endParaRPr lang="ja-JP" altLang="en-US" sz="600" dirty="0">
+                <a:latin typeface="Arial" charset="0"/>
+              </a:endParaRPr>
             </a:p>
           </p:txBody>
         </p:sp>
         <p:sp>
           <p:nvSpPr>
-            <p:cNvPr id="8" name="正方形/長方形 7"/>
+            <p:cNvPr id="9" name="正方形/長方形 8"/>
             <p:cNvSpPr/>
             <p:nvPr/>
           </p:nvSpPr>
           <p:spPr>
             <a:xfrm>
-              <a:off x="2198145" y="7624818"/>
-              <a:ext cx="1049812" cy="468166"/>
+              <a:off x="3991868" y="2570697"/>
+              <a:ext cx="1049811" cy="468166"/>
             </a:xfrm>
             <a:prstGeom prst="rect">
               <a:avLst/>
@@ -3533,63 +3700,14 @@
             <a:p>
               <a:pPr algn="ctr"/>
               <a:r>
-                <a:rPr lang="en-US" altLang="ja-JP" sz="800" dirty="0"/>
-                <a:t>IoT Driver Insights</a:t>
-              </a:r>
-              <a:endParaRPr lang="ja-JP" altLang="en-US" sz="800" dirty="0"/>
-            </a:p>
-          </p:txBody>
-        </p:sp>
-        <p:sp>
-          <p:nvSpPr>
-            <p:cNvPr id="9" name="正方形/長方形 8"/>
-            <p:cNvSpPr/>
-            <p:nvPr/>
-          </p:nvSpPr>
-          <p:spPr>
-            <a:xfrm>
-              <a:off x="3991868" y="2570702"/>
-              <a:ext cx="1049812" cy="468166"/>
-            </a:xfrm>
-            <a:prstGeom prst="rect">
-              <a:avLst/>
-            </a:prstGeom>
-            <a:noFill/>
-            <a:ln>
-              <a:noFill/>
-            </a:ln>
-          </p:spPr>
-          <p:style>
-            <a:lnRef idx="2">
-              <a:schemeClr val="accent1">
-                <a:shade val="50000"/>
-              </a:schemeClr>
-            </a:lnRef>
-            <a:fillRef idx="1">
-              <a:schemeClr val="accent1"/>
-            </a:fillRef>
-            <a:effectRef idx="0">
-              <a:schemeClr val="accent1"/>
-            </a:effectRef>
-            <a:fontRef idx="minor">
-              <a:schemeClr val="lt1"/>
-            </a:fontRef>
-          </p:style>
-          <p:txBody>
-            <a:bodyPr rot="0" spcFirstLastPara="0" vertOverflow="overflow" horzOverflow="overflow" vert="horz" wrap="square" lIns="51435" tIns="25718" rIns="51435" bIns="25718" numCol="1" spcCol="0" rtlCol="0" fromWordArt="0" anchor="ctr" anchorCtr="0" forceAA="0" compatLnSpc="1">
-              <a:prstTxWarp prst="textNoShape">
-                <a:avLst/>
-              </a:prstTxWarp>
-              <a:noAutofit/>
-            </a:bodyPr>
-            <a:lstStyle/>
-            <a:p>
-              <a:pPr algn="ctr"/>
-              <a:r>
-                <a:rPr lang="en-US" altLang="ja-JP" sz="800" dirty="0"/>
+                <a:rPr lang="en-US" altLang="ja-JP" sz="600" dirty="0">
+                  <a:latin typeface="Arial" charset="0"/>
+                </a:rPr>
                 <a:t>IoT Map Insights</a:t>
               </a:r>
-              <a:endParaRPr lang="ja-JP" altLang="en-US" sz="800" dirty="0"/>
+              <a:endParaRPr lang="ja-JP" altLang="en-US" sz="600" dirty="0">
+                <a:latin typeface="Arial" charset="0"/>
+              </a:endParaRPr>
             </a:p>
           </p:txBody>
         </p:sp>
@@ -3598,21 +3716,30 @@
             <p:cNvPr id="11" name="直線コネクタ 10"/>
             <p:cNvCxnSpPr>
               <a:stCxn id="4" idx="2"/>
-              <a:endCxn id="7" idx="2"/>
             </p:cNvCxnSpPr>
             <p:nvPr/>
           </p:nvCxnSpPr>
           <p:spPr>
             <a:xfrm>
-              <a:off x="676131" y="737108"/>
-              <a:ext cx="53168" cy="7355876"/>
+              <a:off x="676132" y="737105"/>
+              <a:ext cx="53168" cy="7355868"/>
             </a:xfrm>
             <a:prstGeom prst="line">
               <a:avLst/>
             </a:prstGeom>
-            <a:ln w="19050">
-              <a:prstDash val="dash"/>
+            <a:ln w="12700">
+              <a:solidFill>
+                <a:schemeClr val="accent5"/>
+              </a:solidFill>
+              <a:prstDash val="sysDot"/>
             </a:ln>
+            <a:effectLst>
+              <a:outerShdw blurRad="50800" dist="76200" dir="2700000" algn="tl" rotWithShape="0">
+                <a:prstClr val="black">
+                  <a:alpha val="40000"/>
+                </a:prstClr>
+              </a:outerShdw>
+            </a:effectLst>
           </p:spPr>
           <p:style>
             <a:lnRef idx="1">
@@ -3640,15 +3767,25 @@
           </p:nvCxnSpPr>
           <p:spPr>
             <a:xfrm>
-              <a:off x="2723051" y="737108"/>
-              <a:ext cx="0" cy="7355876"/>
+              <a:off x="2723050" y="737105"/>
+              <a:ext cx="0" cy="7355868"/>
             </a:xfrm>
             <a:prstGeom prst="line">
               <a:avLst/>
             </a:prstGeom>
-            <a:ln w="19050">
-              <a:prstDash val="dash"/>
+            <a:ln w="12700">
+              <a:solidFill>
+                <a:schemeClr val="accent5"/>
+              </a:solidFill>
+              <a:prstDash val="sysDot"/>
             </a:ln>
+            <a:effectLst>
+              <a:outerShdw blurRad="50800" dist="76200" dir="2700000" algn="tl" rotWithShape="0">
+                <a:prstClr val="black">
+                  <a:alpha val="40000"/>
+                </a:prstClr>
+              </a:outerShdw>
+            </a:effectLst>
           </p:spPr>
           <p:style>
             <a:lnRef idx="1">
@@ -3676,15 +3813,25 @@
           </p:nvCxnSpPr>
           <p:spPr>
             <a:xfrm>
-              <a:off x="4516774" y="737108"/>
-              <a:ext cx="0" cy="2301760"/>
+              <a:off x="4516774" y="737105"/>
+              <a:ext cx="0" cy="2301757"/>
             </a:xfrm>
             <a:prstGeom prst="line">
               <a:avLst/>
             </a:prstGeom>
-            <a:ln w="19050">
-              <a:prstDash val="dash"/>
+            <a:ln w="12700">
+              <a:solidFill>
+                <a:schemeClr val="accent5"/>
+              </a:solidFill>
+              <a:prstDash val="sysDot"/>
             </a:ln>
+            <a:effectLst>
+              <a:outerShdw blurRad="50800" dist="76200" dir="2700000" algn="tl" rotWithShape="0">
+                <a:prstClr val="black">
+                  <a:alpha val="40000"/>
+                </a:prstClr>
+              </a:outerShdw>
+            </a:effectLst>
           </p:spPr>
           <p:style>
             <a:lnRef idx="1">
@@ -3709,8 +3856,8 @@
           </p:nvSpPr>
           <p:spPr>
             <a:xfrm>
-              <a:off x="882762" y="1108767"/>
-              <a:ext cx="1811390" cy="210598"/>
+              <a:off x="1077928" y="1114532"/>
+              <a:ext cx="1013718" cy="167788"/>
             </a:xfrm>
             <a:prstGeom prst="rect">
               <a:avLst/>
@@ -3728,14 +3875,20 @@
             <a:lstStyle/>
             <a:p>
               <a:r>
-                <a:rPr lang="en-US" altLang="ja-JP" sz="700" dirty="0" smtClean="0"/>
-                <a:t>[Request] </a:t>
+                <a:rPr lang="en-US" altLang="ja-JP" sz="600" dirty="0" smtClean="0">
+                  <a:latin typeface="Arial" charset="0"/>
+                </a:rPr>
+                <a:t>Car </a:t>
               </a:r>
               <a:r>
-                <a:rPr lang="en-US" altLang="ja-JP" sz="700" dirty="0"/>
-                <a:t>Car Probe Data</a:t>
+                <a:rPr lang="en-US" altLang="ja-JP" sz="600" dirty="0">
+                  <a:latin typeface="Arial" charset="0"/>
+                </a:rPr>
+                <a:t>Probe Data</a:t>
               </a:r>
-              <a:endParaRPr lang="ja-JP" altLang="en-US" sz="700" dirty="0"/>
+              <a:endParaRPr lang="ja-JP" altLang="en-US" sz="600" dirty="0">
+                <a:latin typeface="Arial" charset="0"/>
+              </a:endParaRPr>
             </a:p>
           </p:txBody>
         </p:sp>
@@ -3747,8 +3900,8 @@
           </p:nvSpPr>
           <p:spPr>
             <a:xfrm>
-              <a:off x="4761160" y="1345139"/>
-              <a:ext cx="1504267" cy="240684"/>
+              <a:off x="4761161" y="1345136"/>
+              <a:ext cx="1532230" cy="223718"/>
             </a:xfrm>
             <a:prstGeom prst="rect">
               <a:avLst/>
@@ -3762,10 +3915,14 @@
             <a:lstStyle/>
             <a:p>
               <a:r>
-                <a:rPr lang="en-US" altLang="ja-JP" sz="800" dirty="0"/>
+                <a:rPr lang="en-US" altLang="ja-JP" sz="800" dirty="0">
+                  <a:latin typeface="Arial" charset="0"/>
+                </a:rPr>
                 <a:t>API: mapMatching</a:t>
               </a:r>
-              <a:endParaRPr lang="ja-JP" altLang="en-US" sz="800" dirty="0"/>
+              <a:endParaRPr lang="ja-JP" altLang="en-US" sz="800" dirty="0">
+                <a:latin typeface="Arial" charset="0"/>
+              </a:endParaRPr>
             </a:p>
           </p:txBody>
         </p:sp>
@@ -3777,8 +3934,8 @@
           </p:nvSpPr>
           <p:spPr>
             <a:xfrm>
-              <a:off x="882762" y="1543137"/>
-              <a:ext cx="2961528" cy="210598"/>
+              <a:off x="1077928" y="1655957"/>
+              <a:ext cx="1902179" cy="167788"/>
             </a:xfrm>
             <a:prstGeom prst="rect">
               <a:avLst/>
@@ -3796,14 +3953,20 @@
             <a:lstStyle/>
             <a:p>
               <a:r>
-                <a:rPr lang="en-US" altLang="ja-JP" sz="700" dirty="0" smtClean="0"/>
-                <a:t>[Response] </a:t>
+                <a:rPr lang="en-US" altLang="ja-JP" sz="600" dirty="0" smtClean="0">
+                  <a:latin typeface="Arial" charset="0"/>
+                </a:rPr>
+                <a:t>Map </a:t>
               </a:r>
               <a:r>
-                <a:rPr lang="en-US" altLang="ja-JP" sz="700" dirty="0"/>
-                <a:t>Map Matched Car Probe Data</a:t>
+                <a:rPr lang="en-US" altLang="ja-JP" sz="600" dirty="0">
+                  <a:latin typeface="Arial" charset="0"/>
+                </a:rPr>
+                <a:t>Matched Car Probe Data</a:t>
               </a:r>
-              <a:endParaRPr lang="ja-JP" altLang="en-US" sz="700" dirty="0"/>
+              <a:endParaRPr lang="ja-JP" altLang="en-US" sz="600" dirty="0">
+                <a:latin typeface="Arial" charset="0"/>
+              </a:endParaRPr>
             </a:p>
           </p:txBody>
         </p:sp>
@@ -3815,17 +3978,18 @@
           </p:nvCxnSpPr>
           <p:spPr>
             <a:xfrm>
-              <a:off x="676131" y="1411814"/>
-              <a:ext cx="3656476" cy="0"/>
+              <a:off x="676132" y="1308014"/>
+              <a:ext cx="3745292" cy="1459"/>
             </a:xfrm>
             <a:prstGeom prst="straightConnector1">
               <a:avLst/>
             </a:prstGeom>
-            <a:ln w="19050">
+            <a:ln w="9525">
               <a:solidFill>
                 <a:schemeClr val="tx1"/>
               </a:solidFill>
-              <a:tailEnd type="arrow"/>
+              <a:headEnd type="none" w="med" len="med"/>
+              <a:tailEnd type="triangle" w="med" len="med"/>
             </a:ln>
           </p:spPr>
           <p:style>
@@ -3846,22 +4010,24 @@
         <p:cxnSp>
           <p:nvCxnSpPr>
             <p:cNvPr id="21" name="直線矢印コネクタ 20"/>
-            <p:cNvCxnSpPr/>
+            <p:cNvCxnSpPr>
+              <a:stCxn id="44" idx="2"/>
+            </p:cNvCxnSpPr>
             <p:nvPr/>
           </p:nvCxnSpPr>
           <p:spPr>
-            <a:xfrm flipH="1">
-              <a:off x="676131" y="1543137"/>
-              <a:ext cx="3656476" cy="0"/>
+            <a:xfrm flipH="1" flipV="1">
+              <a:off x="676132" y="1612368"/>
+              <a:ext cx="3848590" cy="6905"/>
             </a:xfrm>
             <a:prstGeom prst="straightConnector1">
               <a:avLst/>
             </a:prstGeom>
-            <a:ln w="19050">
+            <a:ln w="9525">
               <a:solidFill>
                 <a:schemeClr val="tx1"/>
               </a:solidFill>
-              <a:prstDash val="dash"/>
+              <a:prstDash val="sysDash"/>
               <a:tailEnd type="arrow"/>
             </a:ln>
           </p:spPr>
@@ -3887,18 +4053,19 @@
             <p:nvPr/>
           </p:nvCxnSpPr>
           <p:spPr>
-            <a:xfrm>
-              <a:off x="676131" y="2538371"/>
-              <a:ext cx="3656476" cy="0"/>
+            <a:xfrm flipV="1">
+              <a:off x="676132" y="2457627"/>
+              <a:ext cx="3751062" cy="5733"/>
             </a:xfrm>
             <a:prstGeom prst="straightConnector1">
               <a:avLst/>
             </a:prstGeom>
-            <a:ln w="19050">
+            <a:ln w="9525">
               <a:solidFill>
                 <a:schemeClr val="tx1"/>
               </a:solidFill>
-              <a:tailEnd type="arrow"/>
+              <a:headEnd type="none" w="med" len="med"/>
+              <a:tailEnd type="triangle" w="med" len="med"/>
             </a:ln>
           </p:spPr>
           <p:style>
@@ -3919,22 +4086,24 @@
         <p:cxnSp>
           <p:nvCxnSpPr>
             <p:cNvPr id="26" name="直線矢印コネクタ 25"/>
-            <p:cNvCxnSpPr/>
+            <p:cNvCxnSpPr>
+              <a:stCxn id="45" idx="2"/>
+            </p:cNvCxnSpPr>
             <p:nvPr/>
           </p:nvCxnSpPr>
           <p:spPr>
-            <a:xfrm flipH="1">
-              <a:off x="676131" y="2669695"/>
-              <a:ext cx="3656476" cy="0"/>
+            <a:xfrm flipH="1" flipV="1">
+              <a:off x="676132" y="2756233"/>
+              <a:ext cx="3848590" cy="14959"/>
             </a:xfrm>
             <a:prstGeom prst="straightConnector1">
               <a:avLst/>
             </a:prstGeom>
-            <a:ln w="19050">
+            <a:ln w="9525">
               <a:solidFill>
                 <a:schemeClr val="tx1"/>
               </a:solidFill>
-              <a:prstDash val="dash"/>
+              <a:prstDash val="sysDash"/>
               <a:tailEnd type="arrow"/>
             </a:ln>
           </p:spPr>
@@ -3961,8 +4130,8 @@
           </p:nvSpPr>
           <p:spPr>
             <a:xfrm>
-              <a:off x="882760" y="2235323"/>
-              <a:ext cx="1607687" cy="210598"/>
+              <a:off x="1077928" y="2258396"/>
+              <a:ext cx="812723" cy="167788"/>
             </a:xfrm>
             <a:prstGeom prst="rect">
               <a:avLst/>
@@ -3980,10 +4149,20 @@
             <a:lstStyle/>
             <a:p>
               <a:r>
-                <a:rPr lang="en-US" altLang="ja-JP" sz="700" dirty="0" smtClean="0"/>
-                <a:t>[Request] Road Link ID</a:t>
+                <a:rPr lang="en-US" altLang="ja-JP" sz="600" dirty="0" smtClean="0">
+                  <a:latin typeface="Arial" charset="0"/>
+                </a:rPr>
+                <a:t>Road </a:t>
               </a:r>
-              <a:endParaRPr lang="ja-JP" altLang="en-US" sz="700" dirty="0"/>
+              <a:r>
+                <a:rPr lang="en-US" altLang="ja-JP" sz="600" dirty="0">
+                  <a:latin typeface="Arial" charset="0"/>
+                </a:rPr>
+                <a:t>Link ID</a:t>
+              </a:r>
+              <a:endParaRPr lang="ja-JP" altLang="en-US" sz="600" dirty="0">
+                <a:latin typeface="Arial" charset="0"/>
+              </a:endParaRPr>
             </a:p>
           </p:txBody>
         </p:sp>
@@ -3995,8 +4174,8 @@
           </p:nvSpPr>
           <p:spPr>
             <a:xfrm>
-              <a:off x="4730532" y="2477110"/>
-              <a:ext cx="1933612" cy="240684"/>
+              <a:off x="4730532" y="2477106"/>
+              <a:ext cx="1951699" cy="223718"/>
             </a:xfrm>
             <a:prstGeom prst="rect">
               <a:avLst/>
@@ -4010,14 +4189,14 @@
             <a:lstStyle/>
             <a:p>
               <a:r>
-                <a:rPr lang="en-US" altLang="ja-JP" sz="800" dirty="0"/>
-                <a:t>API: </a:t>
+                <a:rPr lang="en-US" altLang="ja-JP" sz="800" dirty="0">
+                  <a:latin typeface="Arial" charset="0"/>
+                </a:rPr>
+                <a:t>API: getLinkInformation</a:t>
               </a:r>
-              <a:r>
-                <a:rPr lang="en-US" altLang="ja-JP" sz="800" dirty="0" smtClean="0"/>
-                <a:t>getLinkInformation</a:t>
-              </a:r>
-              <a:endParaRPr lang="ja-JP" altLang="en-US" sz="800" dirty="0"/>
+              <a:endParaRPr lang="ja-JP" altLang="en-US" sz="800" dirty="0">
+                <a:latin typeface="Arial" charset="0"/>
+              </a:endParaRPr>
             </a:p>
           </p:txBody>
         </p:sp>
@@ -4029,8 +4208,8 @@
           </p:nvSpPr>
           <p:spPr>
             <a:xfrm>
-              <a:off x="882762" y="2671107"/>
-              <a:ext cx="1576349" cy="210598"/>
+              <a:off x="1077928" y="2798214"/>
+              <a:ext cx="687465" cy="167788"/>
             </a:xfrm>
             <a:prstGeom prst="rect">
               <a:avLst/>
@@ -4048,10 +4227,20 @@
             <a:lstStyle/>
             <a:p>
               <a:r>
-                <a:rPr lang="en-US" altLang="ja-JP" sz="700" dirty="0" smtClean="0"/>
-                <a:t>[Response] Road Type</a:t>
+                <a:rPr lang="en-US" altLang="ja-JP" sz="600" dirty="0" smtClean="0">
+                  <a:latin typeface="Arial" charset="0"/>
+                </a:rPr>
+                <a:t>Road </a:t>
               </a:r>
-              <a:endParaRPr lang="ja-JP" altLang="en-US" sz="700" dirty="0"/>
+              <a:r>
+                <a:rPr lang="en-US" altLang="ja-JP" sz="600" dirty="0">
+                  <a:latin typeface="Arial" charset="0"/>
+                </a:rPr>
+                <a:t>Type</a:t>
+              </a:r>
+              <a:endParaRPr lang="ja-JP" altLang="en-US" sz="600" dirty="0">
+                <a:latin typeface="Arial" charset="0"/>
+              </a:endParaRPr>
             </a:p>
           </p:txBody>
         </p:sp>
@@ -4063,18 +4252,23 @@
           </p:nvSpPr>
           <p:spPr>
             <a:xfrm>
-              <a:off x="4376982" y="1308018"/>
-              <a:ext cx="271196" cy="311260"/>
+              <a:off x="4446218" y="1308014"/>
+              <a:ext cx="157006" cy="311260"/>
             </a:xfrm>
             <a:prstGeom prst="rect">
               <a:avLst/>
             </a:prstGeom>
             <a:solidFill>
-              <a:schemeClr val="accent1">
-                <a:lumMod val="20000"/>
-                <a:lumOff val="80000"/>
-              </a:schemeClr>
+              <a:srgbClr val="E5F2FF"/>
             </a:solidFill>
+            <a:ln w="9525"/>
+            <a:effectLst>
+              <a:outerShdw blurRad="50800" dist="76200" dir="2700000" algn="tl" rotWithShape="0">
+                <a:prstClr val="black">
+                  <a:alpha val="40000"/>
+                </a:prstClr>
+              </a:outerShdw>
+            </a:effectLst>
           </p:spPr>
           <p:style>
             <a:lnRef idx="2">
@@ -4097,7 +4291,9 @@
             <a:lstStyle/>
             <a:p>
               <a:pPr algn="ctr"/>
-              <a:endParaRPr kumimoji="1" lang="ja-JP" altLang="en-US" sz="900"/>
+              <a:endParaRPr lang="ja-JP" altLang="en-US" sz="600">
+                <a:latin typeface="Arial" charset="0"/>
+              </a:endParaRPr>
             </a:p>
           </p:txBody>
         </p:sp>
@@ -4109,18 +4305,23 @@
           </p:nvSpPr>
           <p:spPr>
             <a:xfrm>
-              <a:off x="4376982" y="2459938"/>
-              <a:ext cx="271196" cy="311260"/>
+              <a:off x="4446218" y="2459933"/>
+              <a:ext cx="157006" cy="311260"/>
             </a:xfrm>
             <a:prstGeom prst="rect">
               <a:avLst/>
             </a:prstGeom>
             <a:solidFill>
-              <a:schemeClr val="accent1">
-                <a:lumMod val="20000"/>
-                <a:lumOff val="80000"/>
-              </a:schemeClr>
+              <a:srgbClr val="E5F2FF"/>
             </a:solidFill>
+            <a:ln w="9525"/>
+            <a:effectLst>
+              <a:outerShdw blurRad="50800" dist="76200" dir="2700000" algn="tl" rotWithShape="0">
+                <a:prstClr val="black">
+                  <a:alpha val="40000"/>
+                </a:prstClr>
+              </a:outerShdw>
+            </a:effectLst>
           </p:spPr>
           <p:style>
             <a:lnRef idx="2">
@@ -4143,7 +4344,9 @@
             <a:lstStyle/>
             <a:p>
               <a:pPr algn="ctr"/>
-              <a:endParaRPr kumimoji="1" lang="ja-JP" altLang="en-US" sz="900"/>
+              <a:endParaRPr lang="ja-JP" altLang="en-US" sz="600">
+                <a:latin typeface="Arial" charset="0"/>
+              </a:endParaRPr>
             </a:p>
           </p:txBody>
         </p:sp>
@@ -4154,18 +4357,19 @@
             <p:nvPr/>
           </p:nvCxnSpPr>
           <p:spPr>
-            <a:xfrm>
-              <a:off x="676131" y="3535363"/>
-              <a:ext cx="1910638" cy="0"/>
+            <a:xfrm flipV="1">
+              <a:off x="682708" y="3403844"/>
+              <a:ext cx="1938593" cy="5770"/>
             </a:xfrm>
             <a:prstGeom prst="straightConnector1">
               <a:avLst/>
             </a:prstGeom>
-            <a:ln w="19050">
+            <a:ln w="9525">
               <a:solidFill>
                 <a:schemeClr val="tx1"/>
               </a:solidFill>
-              <a:tailEnd type="arrow"/>
+              <a:headEnd type="none" w="med" len="med"/>
+              <a:tailEnd type="triangle" w="med" len="med"/>
             </a:ln>
           </p:spPr>
           <p:style>
@@ -4191,8 +4395,8 @@
           </p:nvSpPr>
           <p:spPr>
             <a:xfrm>
-              <a:off x="802579" y="3218175"/>
-              <a:ext cx="3773207" cy="210598"/>
+              <a:off x="1077928" y="3172013"/>
+              <a:ext cx="2665381" cy="167788"/>
             </a:xfrm>
             <a:prstGeom prst="rect">
               <a:avLst/>
@@ -4210,10 +4414,32 @@
             <a:lstStyle/>
             <a:p>
               <a:r>
-                <a:rPr lang="en-US" altLang="ja-JP" sz="700" dirty="0" smtClean="0"/>
-                <a:t>[Request] Map Matched Car Probe Data + Road Type</a:t>
+                <a:rPr lang="en-US" altLang="ja-JP" sz="600" dirty="0" smtClean="0">
+                  <a:latin typeface="Arial" charset="0"/>
+                </a:rPr>
+                <a:t>Map </a:t>
               </a:r>
-              <a:endParaRPr lang="ja-JP" altLang="en-US" sz="700" dirty="0"/>
+              <a:r>
+                <a:rPr lang="en-US" altLang="ja-JP" sz="600" dirty="0">
+                  <a:latin typeface="Arial" charset="0"/>
+                </a:rPr>
+                <a:t>Matched Car Probe </a:t>
+              </a:r>
+              <a:r>
+                <a:rPr lang="en-US" altLang="ja-JP" sz="600" dirty="0" smtClean="0">
+                  <a:latin typeface="Arial" charset="0"/>
+                </a:rPr>
+                <a:t>Data, Road </a:t>
+              </a:r>
+              <a:r>
+                <a:rPr lang="en-US" altLang="ja-JP" sz="600" dirty="0">
+                  <a:latin typeface="Arial" charset="0"/>
+                </a:rPr>
+                <a:t>Type</a:t>
+              </a:r>
+              <a:endParaRPr lang="ja-JP" altLang="en-US" sz="600" dirty="0">
+                <a:latin typeface="Arial" charset="0"/>
+              </a:endParaRPr>
             </a:p>
           </p:txBody>
         </p:sp>
@@ -4225,8 +4451,8 @@
           </p:nvSpPr>
           <p:spPr>
             <a:xfrm>
-              <a:off x="2910548" y="3443521"/>
-              <a:ext cx="1516803" cy="240684"/>
+              <a:off x="2910548" y="3443516"/>
+              <a:ext cx="1616707" cy="223718"/>
             </a:xfrm>
             <a:prstGeom prst="rect">
               <a:avLst/>
@@ -4242,212 +4468,21 @@
               <a:r>
                 <a:rPr lang="en-US" altLang="ja-JP" sz="800" dirty="0">
                   <a:solidFill>
-                    <a:schemeClr val="accent2"/>
+                    <a:schemeClr val="accent5"/>
                   </a:solidFill>
+                  <a:latin typeface="Arial" charset="0"/>
                 </a:rPr>
-                <a:t>API: </a:t>
-              </a:r>
-              <a:r>
-                <a:rPr lang="en-US" altLang="ja-JP" sz="800" dirty="0" smtClean="0">
-                  <a:solidFill>
-                    <a:schemeClr val="accent2"/>
-                  </a:solidFill>
-                </a:rPr>
-                <a:t>sendCarProbe</a:t>
+                <a:t>API: sendCarProbe</a:t>
               </a:r>
               <a:endParaRPr lang="ja-JP" altLang="en-US" sz="800" dirty="0">
                 <a:solidFill>
-                  <a:schemeClr val="accent2"/>
+                  <a:schemeClr val="accent5"/>
                 </a:solidFill>
+                <a:latin typeface="Arial" charset="0"/>
               </a:endParaRPr>
             </a:p>
           </p:txBody>
         </p:sp>
-        <p:sp>
-          <p:nvSpPr>
-            <p:cNvPr id="60" name="正方形/長方形 59"/>
-            <p:cNvSpPr/>
-            <p:nvPr/>
-          </p:nvSpPr>
-          <p:spPr>
-            <a:xfrm>
-              <a:off x="2586769" y="3404923"/>
-              <a:ext cx="271196" cy="311260"/>
-            </a:xfrm>
-            <a:prstGeom prst="rect">
-              <a:avLst/>
-            </a:prstGeom>
-            <a:solidFill>
-              <a:schemeClr val="accent2">
-                <a:lumMod val="20000"/>
-                <a:lumOff val="80000"/>
-              </a:schemeClr>
-            </a:solidFill>
-            <a:ln w="25400">
-              <a:solidFill>
-                <a:schemeClr val="accent2"/>
-              </a:solidFill>
-            </a:ln>
-          </p:spPr>
-          <p:style>
-            <a:lnRef idx="2">
-              <a:schemeClr val="accent1">
-                <a:shade val="50000"/>
-              </a:schemeClr>
-            </a:lnRef>
-            <a:fillRef idx="1">
-              <a:schemeClr val="accent1"/>
-            </a:fillRef>
-            <a:effectRef idx="0">
-              <a:schemeClr val="accent1"/>
-            </a:effectRef>
-            <a:fontRef idx="minor">
-              <a:schemeClr val="lt1"/>
-            </a:fontRef>
-          </p:style>
-          <p:txBody>
-            <a:bodyPr rtlCol="0" anchor="ctr"/>
-            <a:lstStyle/>
-            <a:p>
-              <a:pPr algn="ctr"/>
-              <a:endParaRPr kumimoji="1" lang="ja-JP" altLang="en-US" sz="900">
-                <a:solidFill>
-                  <a:schemeClr val="accent2"/>
-                </a:solidFill>
-              </a:endParaRPr>
-            </a:p>
-          </p:txBody>
-        </p:sp>
-        <p:sp>
-          <p:nvSpPr>
-            <p:cNvPr id="72" name="正方形/長方形 71"/>
-            <p:cNvSpPr/>
-            <p:nvPr/>
-          </p:nvSpPr>
-          <p:spPr>
-            <a:xfrm>
-              <a:off x="204393" y="914400"/>
-              <a:ext cx="6533365" cy="3001384"/>
-            </a:xfrm>
-            <a:prstGeom prst="rect">
-              <a:avLst/>
-            </a:prstGeom>
-            <a:noFill/>
-          </p:spPr>
-          <p:style>
-            <a:lnRef idx="2">
-              <a:schemeClr val="accent1">
-                <a:shade val="50000"/>
-              </a:schemeClr>
-            </a:lnRef>
-            <a:fillRef idx="1">
-              <a:schemeClr val="accent1"/>
-            </a:fillRef>
-            <a:effectRef idx="0">
-              <a:schemeClr val="accent1"/>
-            </a:effectRef>
-            <a:fontRef idx="minor">
-              <a:schemeClr val="lt1"/>
-            </a:fontRef>
-          </p:style>
-          <p:txBody>
-            <a:bodyPr rtlCol="0" anchor="ctr"/>
-            <a:lstStyle/>
-            <a:p>
-              <a:pPr algn="ctr"/>
-              <a:endParaRPr kumimoji="1" lang="ja-JP" altLang="en-US" sz="900"/>
-            </a:p>
-          </p:txBody>
-        </p:sp>
-        <p:sp>
-          <p:nvSpPr>
-            <p:cNvPr id="73" name="メモ 72"/>
-            <p:cNvSpPr/>
-            <p:nvPr/>
-          </p:nvSpPr>
-          <p:spPr>
-            <a:xfrm>
-              <a:off x="204393" y="912989"/>
-              <a:ext cx="389309" cy="195777"/>
-            </a:xfrm>
-            <a:prstGeom prst="foldedCorner">
-              <a:avLst/>
-            </a:prstGeom>
-            <a:noFill/>
-          </p:spPr>
-          <p:style>
-            <a:lnRef idx="2">
-              <a:schemeClr val="accent1">
-                <a:shade val="50000"/>
-              </a:schemeClr>
-            </a:lnRef>
-            <a:fillRef idx="1">
-              <a:schemeClr val="accent1"/>
-            </a:fillRef>
-            <a:effectRef idx="0">
-              <a:schemeClr val="accent1"/>
-            </a:effectRef>
-            <a:fontRef idx="minor">
-              <a:schemeClr val="lt1"/>
-            </a:fontRef>
-          </p:style>
-          <p:txBody>
-            <a:bodyPr lIns="0" tIns="0" rIns="0" bIns="0" rtlCol="0" anchor="ctr"/>
-            <a:lstStyle/>
-            <a:p>
-              <a:pPr algn="ctr"/>
-              <a:r>
-                <a:rPr kumimoji="1" lang="en-US" altLang="ja-JP" sz="600" dirty="0" smtClean="0">
-                  <a:solidFill>
-                    <a:schemeClr val="accent5"/>
-                  </a:solidFill>
-                </a:rPr>
-                <a:t>loop</a:t>
-              </a:r>
-              <a:endParaRPr kumimoji="1" lang="ja-JP" altLang="en-US" sz="600" dirty="0">
-                <a:solidFill>
-                  <a:schemeClr val="accent5"/>
-                </a:solidFill>
-              </a:endParaRPr>
-            </a:p>
-          </p:txBody>
-        </p:sp>
-        <p:cxnSp>
-          <p:nvCxnSpPr>
-            <p:cNvPr id="74" name="直線矢印コネクタ 73"/>
-            <p:cNvCxnSpPr/>
-            <p:nvPr/>
-          </p:nvCxnSpPr>
-          <p:spPr>
-            <a:xfrm>
-              <a:off x="676131" y="4362759"/>
-              <a:ext cx="1910638" cy="0"/>
-            </a:xfrm>
-            <a:prstGeom prst="straightConnector1">
-              <a:avLst/>
-            </a:prstGeom>
-            <a:ln w="19050">
-              <a:solidFill>
-                <a:schemeClr val="tx1"/>
-              </a:solidFill>
-              <a:tailEnd type="arrow"/>
-            </a:ln>
-          </p:spPr>
-          <p:style>
-            <a:lnRef idx="1">
-              <a:schemeClr val="accent1"/>
-            </a:lnRef>
-            <a:fillRef idx="0">
-              <a:schemeClr val="accent1"/>
-            </a:fillRef>
-            <a:effectRef idx="0">
-              <a:schemeClr val="accent1"/>
-            </a:effectRef>
-            <a:fontRef idx="minor">
-              <a:schemeClr val="tx1"/>
-            </a:fontRef>
-          </p:style>
-        </p:cxnSp>
         <p:sp>
           <p:nvSpPr>
             <p:cNvPr id="75" name="テキスト ボックス 74"/>
@@ -4456,8 +4491,8 @@
           </p:nvSpPr>
           <p:spPr>
             <a:xfrm>
-              <a:off x="802579" y="4077843"/>
-              <a:ext cx="1733043" cy="210598"/>
+              <a:off x="1077928" y="4077835"/>
+              <a:ext cx="862243" cy="167788"/>
             </a:xfrm>
             <a:prstGeom prst="rect">
               <a:avLst/>
@@ -4475,64 +4510,19 @@
             <a:lstStyle/>
             <a:p>
               <a:r>
-                <a:rPr lang="en-US" altLang="ja-JP" sz="700" dirty="0" smtClean="0"/>
-                <a:t>[Request] Date From/To</a:t>
+                <a:rPr lang="en-US" altLang="ja-JP" sz="600" dirty="0" smtClean="0">
+                  <a:latin typeface="Arial" charset="0"/>
+                </a:rPr>
+                <a:t>Date </a:t>
               </a:r>
-              <a:endParaRPr lang="ja-JP" altLang="en-US" sz="700" dirty="0"/>
-            </a:p>
-          </p:txBody>
-        </p:sp>
-        <p:sp>
-          <p:nvSpPr>
-            <p:cNvPr id="77" name="正方形/長方形 76"/>
-            <p:cNvSpPr/>
-            <p:nvPr/>
-          </p:nvSpPr>
-          <p:spPr>
-            <a:xfrm>
-              <a:off x="2586769" y="4265994"/>
-              <a:ext cx="271196" cy="311260"/>
-            </a:xfrm>
-            <a:prstGeom prst="rect">
-              <a:avLst/>
-            </a:prstGeom>
-            <a:solidFill>
-              <a:schemeClr val="accent2">
-                <a:lumMod val="20000"/>
-                <a:lumOff val="80000"/>
-              </a:schemeClr>
-            </a:solidFill>
-            <a:ln w="25400">
-              <a:solidFill>
-                <a:schemeClr val="accent2"/>
-              </a:solidFill>
-            </a:ln>
-          </p:spPr>
-          <p:style>
-            <a:lnRef idx="2">
-              <a:schemeClr val="accent1">
-                <a:shade val="50000"/>
-              </a:schemeClr>
-            </a:lnRef>
-            <a:fillRef idx="1">
-              <a:schemeClr val="accent1"/>
-            </a:fillRef>
-            <a:effectRef idx="0">
-              <a:schemeClr val="accent1"/>
-            </a:effectRef>
-            <a:fontRef idx="minor">
-              <a:schemeClr val="lt1"/>
-            </a:fontRef>
-          </p:style>
-          <p:txBody>
-            <a:bodyPr rtlCol="0" anchor="ctr"/>
-            <a:lstStyle/>
-            <a:p>
-              <a:pPr algn="ctr"/>
-              <a:endParaRPr kumimoji="1" lang="ja-JP" altLang="en-US" sz="900">
-                <a:solidFill>
-                  <a:schemeClr val="accent2"/>
-                </a:solidFill>
+              <a:r>
+                <a:rPr lang="en-US" altLang="ja-JP" sz="600" dirty="0">
+                  <a:latin typeface="Arial" charset="0"/>
+                </a:rPr>
+                <a:t>From/To</a:t>
+              </a:r>
+              <a:endParaRPr lang="ja-JP" altLang="en-US" sz="600" dirty="0">
+                <a:latin typeface="Arial" charset="0"/>
               </a:endParaRPr>
             </a:p>
           </p:txBody>
@@ -4540,22 +4530,24 @@
         <p:cxnSp>
           <p:nvCxnSpPr>
             <p:cNvPr id="78" name="直線矢印コネクタ 77"/>
-            <p:cNvCxnSpPr/>
+            <p:cNvCxnSpPr>
+              <a:stCxn id="77" idx="2"/>
+            </p:cNvCxnSpPr>
             <p:nvPr/>
           </p:nvCxnSpPr>
           <p:spPr>
-            <a:xfrm flipH="1">
-              <a:off x="676131" y="4522063"/>
-              <a:ext cx="1880864" cy="0"/>
+            <a:xfrm flipH="1" flipV="1">
+              <a:off x="694634" y="4565460"/>
+              <a:ext cx="2030520" cy="11786"/>
             </a:xfrm>
             <a:prstGeom prst="straightConnector1">
               <a:avLst/>
             </a:prstGeom>
-            <a:ln w="19050">
+            <a:ln w="9525">
               <a:solidFill>
                 <a:schemeClr val="tx1"/>
               </a:solidFill>
-              <a:prstDash val="dash"/>
+              <a:prstDash val="sysDash"/>
               <a:tailEnd type="arrow"/>
             </a:ln>
           </p:spPr>
@@ -4582,8 +4574,8 @@
           </p:nvSpPr>
           <p:spPr>
             <a:xfrm>
-              <a:off x="802578" y="4615480"/>
-              <a:ext cx="1173934" cy="195753"/>
+              <a:off x="1077928" y="4598164"/>
+              <a:ext cx="404906" cy="167788"/>
             </a:xfrm>
             <a:prstGeom prst="rect">
               <a:avLst/>
@@ -4601,14 +4593,20 @@
             <a:lstStyle/>
             <a:p>
               <a:r>
-                <a:rPr lang="en-US" altLang="ja-JP" sz="700" dirty="0"/>
-                <a:t>[Response] </a:t>
+                <a:rPr lang="en-US" altLang="ja-JP" sz="600" dirty="0" smtClean="0">
+                  <a:latin typeface="Arial" charset="0"/>
+                </a:rPr>
+                <a:t>Job </a:t>
               </a:r>
               <a:r>
-                <a:rPr lang="en-US" altLang="ja-JP" sz="700" dirty="0" smtClean="0"/>
-                <a:t>Job ID</a:t>
+                <a:rPr lang="en-US" altLang="ja-JP" sz="600" dirty="0">
+                  <a:latin typeface="Arial" charset="0"/>
+                </a:rPr>
+                <a:t>ID</a:t>
               </a:r>
-              <a:endParaRPr lang="ja-JP" altLang="en-US" sz="700" dirty="0"/>
+              <a:endParaRPr lang="ja-JP" altLang="en-US" sz="600" dirty="0">
+                <a:latin typeface="Arial" charset="0"/>
+              </a:endParaRPr>
             </a:p>
           </p:txBody>
         </p:sp>
@@ -4620,185 +4618,16 @@
           </p:nvSpPr>
           <p:spPr>
             <a:xfrm>
-              <a:off x="204393" y="4970781"/>
-              <a:ext cx="4312381" cy="956652"/>
+              <a:off x="204393" y="4970774"/>
+              <a:ext cx="4312382" cy="956651"/>
             </a:xfrm>
             <a:prstGeom prst="rect">
               <a:avLst/>
             </a:prstGeom>
             <a:noFill/>
-          </p:spPr>
-          <p:style>
-            <a:lnRef idx="2">
-              <a:schemeClr val="accent1">
-                <a:shade val="50000"/>
-              </a:schemeClr>
-            </a:lnRef>
-            <a:fillRef idx="1">
-              <a:schemeClr val="accent1"/>
-            </a:fillRef>
-            <a:effectRef idx="0">
-              <a:schemeClr val="accent1"/>
-            </a:effectRef>
-            <a:fontRef idx="minor">
-              <a:schemeClr val="lt1"/>
-            </a:fontRef>
-          </p:style>
-          <p:txBody>
-            <a:bodyPr rtlCol="0" anchor="ctr"/>
-            <a:lstStyle/>
-            <a:p>
-              <a:pPr algn="ctr"/>
-              <a:endParaRPr kumimoji="1" lang="ja-JP" altLang="en-US" sz="900"/>
-            </a:p>
-          </p:txBody>
-        </p:sp>
-        <p:sp>
-          <p:nvSpPr>
-            <p:cNvPr id="84" name="メモ 83"/>
-            <p:cNvSpPr/>
-            <p:nvPr/>
-          </p:nvSpPr>
-          <p:spPr>
-            <a:xfrm>
-              <a:off x="204393" y="4969370"/>
-              <a:ext cx="389309" cy="195777"/>
-            </a:xfrm>
-            <a:prstGeom prst="foldedCorner">
-              <a:avLst/>
-            </a:prstGeom>
-            <a:noFill/>
-          </p:spPr>
-          <p:style>
-            <a:lnRef idx="2">
-              <a:schemeClr val="accent1">
-                <a:shade val="50000"/>
-              </a:schemeClr>
-            </a:lnRef>
-            <a:fillRef idx="1">
-              <a:schemeClr val="accent1"/>
-            </a:fillRef>
-            <a:effectRef idx="0">
-              <a:schemeClr val="accent1"/>
-            </a:effectRef>
-            <a:fontRef idx="minor">
-              <a:schemeClr val="lt1"/>
-            </a:fontRef>
-          </p:style>
-          <p:txBody>
-            <a:bodyPr lIns="0" tIns="0" rIns="0" bIns="0" rtlCol="0" anchor="ctr"/>
-            <a:lstStyle/>
-            <a:p>
-              <a:pPr algn="ctr"/>
-              <a:r>
-                <a:rPr kumimoji="1" lang="en-US" altLang="ja-JP" sz="600" dirty="0" smtClean="0">
-                  <a:solidFill>
-                    <a:schemeClr val="accent5"/>
-                  </a:solidFill>
-                </a:rPr>
-                <a:t>loop</a:t>
-              </a:r>
-              <a:endParaRPr kumimoji="1" lang="ja-JP" altLang="en-US" sz="600" dirty="0">
-                <a:solidFill>
-                  <a:schemeClr val="accent5"/>
-                </a:solidFill>
-              </a:endParaRPr>
-            </a:p>
-          </p:txBody>
-        </p:sp>
-        <p:cxnSp>
-          <p:nvCxnSpPr>
-            <p:cNvPr id="85" name="直線矢印コネクタ 84"/>
-            <p:cNvCxnSpPr/>
-            <p:nvPr/>
-          </p:nvCxnSpPr>
-          <p:spPr>
-            <a:xfrm>
-              <a:off x="676131" y="5383904"/>
-              <a:ext cx="1910638" cy="0"/>
-            </a:xfrm>
-            <a:prstGeom prst="straightConnector1">
-              <a:avLst/>
-            </a:prstGeom>
-            <a:ln w="19050">
+            <a:ln>
               <a:solidFill>
-                <a:schemeClr val="tx1"/>
-              </a:solidFill>
-              <a:tailEnd type="arrow"/>
-            </a:ln>
-          </p:spPr>
-          <p:style>
-            <a:lnRef idx="1">
-              <a:schemeClr val="accent1"/>
-            </a:lnRef>
-            <a:fillRef idx="0">
-              <a:schemeClr val="accent1"/>
-            </a:fillRef>
-            <a:effectRef idx="0">
-              <a:schemeClr val="accent1"/>
-            </a:effectRef>
-            <a:fontRef idx="minor">
-              <a:schemeClr val="tx1"/>
-            </a:fontRef>
-          </p:style>
-        </p:cxnSp>
-        <p:sp>
-          <p:nvSpPr>
-            <p:cNvPr id="86" name="テキスト ボックス 85"/>
-            <p:cNvSpPr txBox="1"/>
-            <p:nvPr/>
-          </p:nvSpPr>
-          <p:spPr>
-            <a:xfrm>
-              <a:off x="802579" y="5098987"/>
-              <a:ext cx="1159540" cy="210598"/>
-            </a:xfrm>
-            <a:prstGeom prst="rect">
-              <a:avLst/>
-            </a:prstGeom>
-            <a:solidFill>
-              <a:schemeClr val="bg1">
-                <a:alpha val="70000"/>
-              </a:schemeClr>
-            </a:solidFill>
-          </p:spPr>
-          <p:txBody>
-            <a:bodyPr wrap="none" lIns="0" tIns="0" rIns="0" bIns="0" rtlCol="0">
-              <a:spAutoFit/>
-            </a:bodyPr>
-            <a:lstStyle/>
-            <a:p>
-              <a:r>
-                <a:rPr lang="en-US" altLang="ja-JP" sz="700" dirty="0" smtClean="0"/>
-                <a:t>[Request] Job ID</a:t>
-              </a:r>
-              <a:endParaRPr lang="ja-JP" altLang="en-US" sz="700" dirty="0"/>
-            </a:p>
-          </p:txBody>
-        </p:sp>
-        <p:sp>
-          <p:nvSpPr>
-            <p:cNvPr id="88" name="正方形/長方形 87"/>
-            <p:cNvSpPr/>
-            <p:nvPr/>
-          </p:nvSpPr>
-          <p:spPr>
-            <a:xfrm>
-              <a:off x="2586769" y="5287139"/>
-              <a:ext cx="271196" cy="311260"/>
-            </a:xfrm>
-            <a:prstGeom prst="rect">
-              <a:avLst/>
-            </a:prstGeom>
-            <a:solidFill>
-              <a:schemeClr val="accent2">
-                <a:lumMod val="20000"/>
-                <a:lumOff val="80000"/>
-              </a:schemeClr>
-            </a:solidFill>
-            <a:ln w="25400">
-              <a:solidFill>
-                <a:schemeClr val="accent2"/>
+                <a:schemeClr val="accent1"/>
               </a:solidFill>
             </a:ln>
           </p:spPr>
@@ -4823,248 +4652,30 @@
             <a:lstStyle/>
             <a:p>
               <a:pPr algn="ctr"/>
-              <a:endParaRPr kumimoji="1" lang="ja-JP" altLang="en-US" sz="900">
-                <a:solidFill>
-                  <a:schemeClr val="accent2"/>
-                </a:solidFill>
+              <a:endParaRPr lang="ja-JP" altLang="en-US" sz="600">
+                <a:latin typeface="Arial" charset="0"/>
               </a:endParaRPr>
-            </a:p>
-          </p:txBody>
-        </p:sp>
-        <p:cxnSp>
-          <p:nvCxnSpPr>
-            <p:cNvPr id="89" name="直線矢印コネクタ 88"/>
-            <p:cNvCxnSpPr/>
-            <p:nvPr/>
-          </p:nvCxnSpPr>
-          <p:spPr>
-            <a:xfrm flipH="1">
-              <a:off x="676131" y="5543208"/>
-              <a:ext cx="1880864" cy="0"/>
-            </a:xfrm>
-            <a:prstGeom prst="straightConnector1">
-              <a:avLst/>
-            </a:prstGeom>
-            <a:ln w="19050">
-              <a:solidFill>
-                <a:schemeClr val="tx1"/>
-              </a:solidFill>
-              <a:prstDash val="dash"/>
-              <a:tailEnd type="arrow"/>
-            </a:ln>
-          </p:spPr>
-          <p:style>
-            <a:lnRef idx="1">
-              <a:schemeClr val="accent1"/>
-            </a:lnRef>
-            <a:fillRef idx="0">
-              <a:schemeClr val="accent1"/>
-            </a:fillRef>
-            <a:effectRef idx="0">
-              <a:schemeClr val="accent1"/>
-            </a:effectRef>
-            <a:fontRef idx="minor">
-              <a:schemeClr val="tx1"/>
-            </a:fontRef>
-          </p:style>
-        </p:cxnSp>
-        <p:sp>
-          <p:nvSpPr>
-            <p:cNvPr id="90" name="テキスト ボックス 89"/>
-            <p:cNvSpPr txBox="1"/>
-            <p:nvPr/>
-          </p:nvSpPr>
-          <p:spPr>
-            <a:xfrm>
-              <a:off x="802578" y="5636627"/>
-              <a:ext cx="1447754" cy="195753"/>
-            </a:xfrm>
-            <a:prstGeom prst="rect">
-              <a:avLst/>
-            </a:prstGeom>
-            <a:solidFill>
-              <a:schemeClr val="bg1">
-                <a:alpha val="70000"/>
-              </a:schemeClr>
-            </a:solidFill>
-          </p:spPr>
-          <p:txBody>
-            <a:bodyPr wrap="none" lIns="0" tIns="0" rIns="0" bIns="0" rtlCol="0">
-              <a:spAutoFit/>
-            </a:bodyPr>
-            <a:lstStyle/>
-            <a:p>
-              <a:r>
-                <a:rPr lang="en-US" altLang="ja-JP" sz="700" dirty="0"/>
-                <a:t>[Response] </a:t>
-              </a:r>
-              <a:r>
-                <a:rPr lang="en-US" altLang="ja-JP" sz="700" dirty="0" smtClean="0"/>
-                <a:t>Job Status</a:t>
-              </a:r>
-              <a:endParaRPr lang="ja-JP" altLang="en-US" sz="700" dirty="0"/>
             </a:p>
           </p:txBody>
         </p:sp>
         <p:sp>
           <p:nvSpPr>
-            <p:cNvPr id="91" name="テキスト ボックス 90"/>
-            <p:cNvSpPr txBox="1"/>
-            <p:nvPr/>
-          </p:nvSpPr>
-          <p:spPr>
-            <a:xfrm>
-              <a:off x="2910548" y="4291880"/>
-              <a:ext cx="1701704" cy="240684"/>
-            </a:xfrm>
-            <a:prstGeom prst="rect">
-              <a:avLst/>
-            </a:prstGeom>
-            <a:noFill/>
-          </p:spPr>
-          <p:txBody>
-            <a:bodyPr wrap="none" lIns="0" tIns="0" rIns="0" bIns="0" rtlCol="0">
-              <a:spAutoFit/>
-            </a:bodyPr>
-            <a:lstStyle/>
-            <a:p>
-              <a:r>
-                <a:rPr lang="en-US" altLang="ja-JP" sz="800" dirty="0" smtClean="0">
-                  <a:solidFill>
-                    <a:schemeClr val="accent2"/>
-                  </a:solidFill>
-                </a:rPr>
-                <a:t>API: sendJobRequest</a:t>
-              </a:r>
-            </a:p>
-          </p:txBody>
-        </p:sp>
-        <p:sp>
-          <p:nvSpPr>
-            <p:cNvPr id="92" name="テキスト ボックス 91"/>
-            <p:cNvSpPr txBox="1"/>
-            <p:nvPr/>
-          </p:nvSpPr>
-          <p:spPr>
-            <a:xfrm>
-              <a:off x="2910548" y="5326355"/>
-              <a:ext cx="1228485" cy="240684"/>
-            </a:xfrm>
-            <a:prstGeom prst="rect">
-              <a:avLst/>
-            </a:prstGeom>
-            <a:noFill/>
-          </p:spPr>
-          <p:txBody>
-            <a:bodyPr wrap="none" lIns="0" tIns="0" rIns="0" bIns="0" rtlCol="0">
-              <a:spAutoFit/>
-            </a:bodyPr>
-            <a:lstStyle/>
-            <a:p>
-              <a:r>
-                <a:rPr lang="en-US" altLang="ja-JP" sz="800" dirty="0" smtClean="0">
-                  <a:solidFill>
-                    <a:schemeClr val="accent2"/>
-                  </a:solidFill>
-                </a:rPr>
-                <a:t>API: getJobInfo</a:t>
-              </a:r>
-            </a:p>
-          </p:txBody>
-        </p:sp>
-        <p:cxnSp>
-          <p:nvCxnSpPr>
-            <p:cNvPr id="93" name="直線矢印コネクタ 92"/>
-            <p:cNvCxnSpPr/>
-            <p:nvPr/>
-          </p:nvCxnSpPr>
-          <p:spPr>
-            <a:xfrm>
-              <a:off x="676131" y="6413138"/>
-              <a:ext cx="1910638" cy="0"/>
-            </a:xfrm>
-            <a:prstGeom prst="straightConnector1">
-              <a:avLst/>
-            </a:prstGeom>
-            <a:ln w="19050">
-              <a:solidFill>
-                <a:schemeClr val="tx1"/>
-              </a:solidFill>
-              <a:tailEnd type="arrow"/>
-            </a:ln>
-          </p:spPr>
-          <p:style>
-            <a:lnRef idx="1">
-              <a:schemeClr val="accent1"/>
-            </a:lnRef>
-            <a:fillRef idx="0">
-              <a:schemeClr val="accent1"/>
-            </a:fillRef>
-            <a:effectRef idx="0">
-              <a:schemeClr val="accent1"/>
-            </a:effectRef>
-            <a:fontRef idx="minor">
-              <a:schemeClr val="tx1"/>
-            </a:fontRef>
-          </p:style>
-        </p:cxnSp>
-        <p:sp>
-          <p:nvSpPr>
-            <p:cNvPr id="94" name="テキスト ボックス 93"/>
-            <p:cNvSpPr txBox="1"/>
-            <p:nvPr/>
-          </p:nvSpPr>
-          <p:spPr>
-            <a:xfrm>
-              <a:off x="802579" y="6128225"/>
-              <a:ext cx="1159540" cy="210598"/>
-            </a:xfrm>
-            <a:prstGeom prst="rect">
-              <a:avLst/>
-            </a:prstGeom>
-            <a:solidFill>
-              <a:schemeClr val="bg1">
-                <a:alpha val="70000"/>
-              </a:schemeClr>
-            </a:solidFill>
-          </p:spPr>
-          <p:txBody>
-            <a:bodyPr wrap="none" lIns="0" tIns="0" rIns="0" bIns="0" rtlCol="0">
-              <a:spAutoFit/>
-            </a:bodyPr>
-            <a:lstStyle/>
-            <a:p>
-              <a:r>
-                <a:rPr lang="en-US" altLang="ja-JP" sz="700" dirty="0" smtClean="0"/>
-                <a:t>[Request] Job ID</a:t>
-              </a:r>
-              <a:endParaRPr lang="ja-JP" altLang="en-US" sz="700" dirty="0"/>
-            </a:p>
-          </p:txBody>
-        </p:sp>
-        <p:sp>
-          <p:nvSpPr>
-            <p:cNvPr id="95" name="正方形/長方形 94"/>
+            <p:cNvPr id="84" name="メモ 83"/>
             <p:cNvSpPr/>
             <p:nvPr/>
           </p:nvSpPr>
           <p:spPr>
             <a:xfrm>
-              <a:off x="2586769" y="6316373"/>
-              <a:ext cx="271196" cy="311260"/>
+              <a:off x="204393" y="4969362"/>
+              <a:ext cx="389309" cy="195776"/>
             </a:xfrm>
-            <a:prstGeom prst="rect">
+            <a:prstGeom prst="foldedCorner">
               <a:avLst/>
             </a:prstGeom>
-            <a:solidFill>
-              <a:schemeClr val="accent2">
-                <a:lumMod val="20000"/>
-                <a:lumOff val="80000"/>
-              </a:schemeClr>
-            </a:solidFill>
-            <a:ln w="25400">
+            <a:noFill/>
+            <a:ln>
               <a:solidFill>
-                <a:schemeClr val="accent2"/>
+                <a:schemeClr val="accent1"/>
               </a:solidFill>
             </a:ln>
           </p:spPr>
@@ -5085,14 +4696,224 @@
             </a:fontRef>
           </p:style>
           <p:txBody>
-            <a:bodyPr rtlCol="0" anchor="ctr"/>
+            <a:bodyPr lIns="0" tIns="0" rIns="0" bIns="0" rtlCol="0" anchor="ctr"/>
             <a:lstStyle/>
             <a:p>
               <a:pPr algn="ctr"/>
-              <a:endParaRPr kumimoji="1" lang="ja-JP" altLang="en-US" sz="900">
+              <a:r>
+                <a:rPr lang="en-US" altLang="ja-JP" sz="600" dirty="0">
+                  <a:solidFill>
+                    <a:schemeClr val="accent5"/>
+                  </a:solidFill>
+                  <a:latin typeface="Arial" charset="0"/>
+                </a:rPr>
+                <a:t>loop</a:t>
+              </a:r>
+              <a:endParaRPr lang="ja-JP" altLang="en-US" sz="600" dirty="0">
                 <a:solidFill>
-                  <a:schemeClr val="accent2"/>
+                  <a:schemeClr val="accent5"/>
                 </a:solidFill>
+                <a:latin typeface="Arial" charset="0"/>
+              </a:endParaRPr>
+            </a:p>
+          </p:txBody>
+        </p:sp>
+        <p:sp>
+          <p:nvSpPr>
+            <p:cNvPr id="86" name="テキスト ボックス 85"/>
+            <p:cNvSpPr txBox="1"/>
+            <p:nvPr/>
+          </p:nvSpPr>
+          <p:spPr>
+            <a:xfrm>
+              <a:off x="1077928" y="5093210"/>
+              <a:ext cx="404906" cy="167788"/>
+            </a:xfrm>
+            <a:prstGeom prst="rect">
+              <a:avLst/>
+            </a:prstGeom>
+            <a:solidFill>
+              <a:schemeClr val="bg1">
+                <a:alpha val="70000"/>
+              </a:schemeClr>
+            </a:solidFill>
+          </p:spPr>
+          <p:txBody>
+            <a:bodyPr wrap="none" lIns="0" tIns="0" rIns="0" bIns="0" rtlCol="0">
+              <a:spAutoFit/>
+            </a:bodyPr>
+            <a:lstStyle/>
+            <a:p>
+              <a:r>
+                <a:rPr lang="en-US" altLang="ja-JP" sz="600" dirty="0" smtClean="0">
+                  <a:latin typeface="Arial" charset="0"/>
+                </a:rPr>
+                <a:t>Job </a:t>
+              </a:r>
+              <a:r>
+                <a:rPr lang="en-US" altLang="ja-JP" sz="600" dirty="0">
+                  <a:latin typeface="Arial" charset="0"/>
+                </a:rPr>
+                <a:t>ID</a:t>
+              </a:r>
+              <a:endParaRPr lang="ja-JP" altLang="en-US" sz="600" dirty="0">
+                <a:latin typeface="Arial" charset="0"/>
+              </a:endParaRPr>
+            </a:p>
+          </p:txBody>
+        </p:sp>
+        <p:sp>
+          <p:nvSpPr>
+            <p:cNvPr id="90" name="テキスト ボックス 89"/>
+            <p:cNvSpPr txBox="1"/>
+            <p:nvPr/>
+          </p:nvSpPr>
+          <p:spPr>
+            <a:xfrm>
+              <a:off x="1077928" y="5630849"/>
+              <a:ext cx="661248" cy="167788"/>
+            </a:xfrm>
+            <a:prstGeom prst="rect">
+              <a:avLst/>
+            </a:prstGeom>
+            <a:solidFill>
+              <a:schemeClr val="bg1">
+                <a:alpha val="70000"/>
+              </a:schemeClr>
+            </a:solidFill>
+          </p:spPr>
+          <p:txBody>
+            <a:bodyPr wrap="none" lIns="0" tIns="0" rIns="0" bIns="0" rtlCol="0">
+              <a:spAutoFit/>
+            </a:bodyPr>
+            <a:lstStyle/>
+            <a:p>
+              <a:r>
+                <a:rPr lang="en-US" altLang="ja-JP" sz="600" dirty="0" smtClean="0">
+                  <a:latin typeface="Arial" charset="0"/>
+                </a:rPr>
+                <a:t>Job </a:t>
+              </a:r>
+              <a:r>
+                <a:rPr lang="en-US" altLang="ja-JP" sz="600" dirty="0">
+                  <a:latin typeface="Arial" charset="0"/>
+                </a:rPr>
+                <a:t>Status</a:t>
+              </a:r>
+              <a:endParaRPr lang="ja-JP" altLang="en-US" sz="600" dirty="0">
+                <a:latin typeface="Arial" charset="0"/>
+              </a:endParaRPr>
+            </a:p>
+          </p:txBody>
+        </p:sp>
+        <p:sp>
+          <p:nvSpPr>
+            <p:cNvPr id="91" name="テキスト ボックス 90"/>
+            <p:cNvSpPr txBox="1"/>
+            <p:nvPr/>
+          </p:nvSpPr>
+          <p:spPr>
+            <a:xfrm>
+              <a:off x="2910548" y="4291875"/>
+              <a:ext cx="1817702" cy="223718"/>
+            </a:xfrm>
+            <a:prstGeom prst="rect">
+              <a:avLst/>
+            </a:prstGeom>
+            <a:noFill/>
+          </p:spPr>
+          <p:txBody>
+            <a:bodyPr wrap="none" lIns="0" tIns="0" rIns="0" bIns="0" rtlCol="0">
+              <a:spAutoFit/>
+            </a:bodyPr>
+            <a:lstStyle/>
+            <a:p>
+              <a:r>
+                <a:rPr lang="en-US" altLang="ja-JP" sz="800" dirty="0">
+                  <a:solidFill>
+                    <a:schemeClr val="accent5"/>
+                  </a:solidFill>
+                  <a:latin typeface="Arial" charset="0"/>
+                </a:rPr>
+                <a:t>API: sendJobRequest</a:t>
+              </a:r>
+            </a:p>
+          </p:txBody>
+        </p:sp>
+        <p:sp>
+          <p:nvSpPr>
+            <p:cNvPr id="92" name="テキスト ボックス 91"/>
+            <p:cNvSpPr txBox="1"/>
+            <p:nvPr/>
+          </p:nvSpPr>
+          <p:spPr>
+            <a:xfrm>
+              <a:off x="2910548" y="5326346"/>
+              <a:ext cx="1287538" cy="223718"/>
+            </a:xfrm>
+            <a:prstGeom prst="rect">
+              <a:avLst/>
+            </a:prstGeom>
+            <a:noFill/>
+          </p:spPr>
+          <p:txBody>
+            <a:bodyPr wrap="none" lIns="0" tIns="0" rIns="0" bIns="0" rtlCol="0">
+              <a:spAutoFit/>
+            </a:bodyPr>
+            <a:lstStyle/>
+            <a:p>
+              <a:r>
+                <a:rPr lang="en-US" altLang="ja-JP" sz="800" dirty="0">
+                  <a:solidFill>
+                    <a:schemeClr val="accent5"/>
+                  </a:solidFill>
+                  <a:latin typeface="Arial" charset="0"/>
+                </a:rPr>
+                <a:t>API: getJobInfo</a:t>
+              </a:r>
+            </a:p>
+          </p:txBody>
+        </p:sp>
+        <p:sp>
+          <p:nvSpPr>
+            <p:cNvPr id="94" name="テキスト ボックス 93"/>
+            <p:cNvSpPr txBox="1"/>
+            <p:nvPr/>
+          </p:nvSpPr>
+          <p:spPr>
+            <a:xfrm>
+              <a:off x="1077928" y="6128217"/>
+              <a:ext cx="404906" cy="167788"/>
+            </a:xfrm>
+            <a:prstGeom prst="rect">
+              <a:avLst/>
+            </a:prstGeom>
+            <a:solidFill>
+              <a:schemeClr val="bg1">
+                <a:alpha val="70000"/>
+              </a:schemeClr>
+            </a:solidFill>
+          </p:spPr>
+          <p:txBody>
+            <a:bodyPr wrap="none" lIns="0" tIns="0" rIns="0" bIns="0" rtlCol="0">
+              <a:spAutoFit/>
+            </a:bodyPr>
+            <a:lstStyle/>
+            <a:p>
+              <a:r>
+                <a:rPr lang="en-US" altLang="ja-JP" sz="600" dirty="0" smtClean="0">
+                  <a:latin typeface="Arial" charset="0"/>
+                </a:rPr>
+                <a:t>Job </a:t>
+              </a:r>
+              <a:r>
+                <a:rPr lang="en-US" altLang="ja-JP" sz="600" dirty="0">
+                  <a:latin typeface="Arial" charset="0"/>
+                </a:rPr>
+                <a:t>ID</a:t>
+              </a:r>
+              <a:endParaRPr lang="ja-JP" altLang="en-US" sz="600" dirty="0">
+                <a:latin typeface="Arial" charset="0"/>
               </a:endParaRPr>
             </a:p>
           </p:txBody>
@@ -5100,22 +4921,24 @@
         <p:cxnSp>
           <p:nvCxnSpPr>
             <p:cNvPr id="96" name="直線矢印コネクタ 95"/>
-            <p:cNvCxnSpPr/>
+            <p:cNvCxnSpPr>
+              <a:stCxn id="95" idx="2"/>
+            </p:cNvCxnSpPr>
             <p:nvPr/>
           </p:nvCxnSpPr>
           <p:spPr>
-            <a:xfrm flipH="1">
-              <a:off x="676131" y="6572442"/>
-              <a:ext cx="1880864" cy="0"/>
+            <a:xfrm flipH="1" flipV="1">
+              <a:off x="700788" y="6620983"/>
+              <a:ext cx="2024367" cy="6642"/>
             </a:xfrm>
             <a:prstGeom prst="straightConnector1">
               <a:avLst/>
             </a:prstGeom>
-            <a:ln w="19050">
+            <a:ln w="9525">
               <a:solidFill>
                 <a:schemeClr val="tx1"/>
               </a:solidFill>
-              <a:prstDash val="dash"/>
+              <a:prstDash val="sysDash"/>
               <a:tailEnd type="arrow"/>
             </a:ln>
           </p:spPr>
@@ -5142,8 +4965,8 @@
           </p:nvSpPr>
           <p:spPr>
             <a:xfrm>
-              <a:off x="802578" y="6665861"/>
-              <a:ext cx="1683705" cy="195753"/>
+              <a:off x="1077928" y="6660083"/>
+              <a:ext cx="879721" cy="167788"/>
             </a:xfrm>
             <a:prstGeom prst="rect">
               <a:avLst/>
@@ -5161,14 +4984,20 @@
             <a:lstStyle/>
             <a:p>
               <a:r>
-                <a:rPr lang="en-US" altLang="ja-JP" sz="700" dirty="0"/>
-                <a:t>[Response] </a:t>
+                <a:rPr lang="en-US" altLang="ja-JP" sz="600" dirty="0" smtClean="0">
+                  <a:latin typeface="Arial" charset="0"/>
+                </a:rPr>
+                <a:t>Trip </a:t>
               </a:r>
               <a:r>
-                <a:rPr lang="en-US" altLang="ja-JP" sz="700" dirty="0" smtClean="0"/>
-                <a:t>Trip UUID List</a:t>
+                <a:rPr lang="en-US" altLang="ja-JP" sz="600" dirty="0">
+                  <a:latin typeface="Arial" charset="0"/>
+                </a:rPr>
+                <a:t>UUID List</a:t>
               </a:r>
-              <a:endParaRPr lang="ja-JP" altLang="en-US" sz="700" dirty="0"/>
+              <a:endParaRPr lang="ja-JP" altLang="en-US" sz="600" dirty="0">
+                <a:latin typeface="Arial" charset="0"/>
+              </a:endParaRPr>
             </a:p>
           </p:txBody>
         </p:sp>
@@ -5180,8 +5009,8 @@
           </p:nvSpPr>
           <p:spPr>
             <a:xfrm>
-              <a:off x="2910548" y="6355589"/>
-              <a:ext cx="2739022" cy="240684"/>
+              <a:off x="2910548" y="6355582"/>
+              <a:ext cx="2851811" cy="223718"/>
             </a:xfrm>
             <a:prstGeom prst="rect">
               <a:avLst/>
@@ -5195,52 +5024,17 @@
             <a:lstStyle/>
             <a:p>
               <a:r>
-                <a:rPr lang="en-US" altLang="ja-JP" sz="800" dirty="0" smtClean="0">
+                <a:rPr lang="en-US" altLang="ja-JP" sz="800" dirty="0">
                   <a:solidFill>
-                    <a:schemeClr val="accent2"/>
+                    <a:schemeClr val="accent5"/>
                   </a:solidFill>
+                  <a:latin typeface="Arial" charset="0"/>
                 </a:rPr>
                 <a:t>API: getAnalyzedTripSummaryList</a:t>
               </a:r>
             </a:p>
           </p:txBody>
         </p:sp>
-        <p:cxnSp>
-          <p:nvCxnSpPr>
-            <p:cNvPr id="99" name="直線矢印コネクタ 98"/>
-            <p:cNvCxnSpPr/>
-            <p:nvPr/>
-          </p:nvCxnSpPr>
-          <p:spPr>
-            <a:xfrm>
-              <a:off x="676131" y="7501513"/>
-              <a:ext cx="1910638" cy="0"/>
-            </a:xfrm>
-            <a:prstGeom prst="straightConnector1">
-              <a:avLst/>
-            </a:prstGeom>
-            <a:ln w="19050">
-              <a:solidFill>
-                <a:schemeClr val="tx1"/>
-              </a:solidFill>
-              <a:tailEnd type="arrow"/>
-            </a:ln>
-          </p:spPr>
-          <p:style>
-            <a:lnRef idx="1">
-              <a:schemeClr val="accent1"/>
-            </a:lnRef>
-            <a:fillRef idx="0">
-              <a:schemeClr val="accent1"/>
-            </a:fillRef>
-            <a:effectRef idx="0">
-              <a:schemeClr val="accent1"/>
-            </a:effectRef>
-            <a:fontRef idx="minor">
-              <a:schemeClr val="tx1"/>
-            </a:fontRef>
-          </p:style>
-        </p:cxnSp>
         <p:sp>
           <p:nvSpPr>
             <p:cNvPr id="100" name="テキスト ボックス 99"/>
@@ -5249,8 +5043,8 @@
           </p:nvSpPr>
           <p:spPr>
             <a:xfrm>
-              <a:off x="802579" y="7216597"/>
-              <a:ext cx="1422786" cy="210598"/>
+              <a:off x="1077928" y="7210821"/>
+              <a:ext cx="623379" cy="167788"/>
             </a:xfrm>
             <a:prstGeom prst="rect">
               <a:avLst/>
@@ -5268,64 +5062,19 @@
             <a:lstStyle/>
             <a:p>
               <a:r>
-                <a:rPr lang="en-US" altLang="ja-JP" sz="700" dirty="0" smtClean="0"/>
-                <a:t>[Request] Trip UUID</a:t>
+                <a:rPr lang="en-US" altLang="ja-JP" sz="600" dirty="0" smtClean="0">
+                  <a:latin typeface="Arial" charset="0"/>
+                </a:rPr>
+                <a:t>Trip </a:t>
               </a:r>
-              <a:endParaRPr lang="ja-JP" altLang="en-US" sz="700" dirty="0"/>
-            </a:p>
-          </p:txBody>
-        </p:sp>
-        <p:sp>
-          <p:nvSpPr>
-            <p:cNvPr id="101" name="正方形/長方形 100"/>
-            <p:cNvSpPr/>
-            <p:nvPr/>
-          </p:nvSpPr>
-          <p:spPr>
-            <a:xfrm>
-              <a:off x="2586769" y="7404748"/>
-              <a:ext cx="271196" cy="311260"/>
-            </a:xfrm>
-            <a:prstGeom prst="rect">
-              <a:avLst/>
-            </a:prstGeom>
-            <a:solidFill>
-              <a:schemeClr val="accent2">
-                <a:lumMod val="20000"/>
-                <a:lumOff val="80000"/>
-              </a:schemeClr>
-            </a:solidFill>
-            <a:ln w="25400">
-              <a:solidFill>
-                <a:schemeClr val="accent2"/>
-              </a:solidFill>
-            </a:ln>
-          </p:spPr>
-          <p:style>
-            <a:lnRef idx="2">
-              <a:schemeClr val="accent1">
-                <a:shade val="50000"/>
-              </a:schemeClr>
-            </a:lnRef>
-            <a:fillRef idx="1">
-              <a:schemeClr val="accent1"/>
-            </a:fillRef>
-            <a:effectRef idx="0">
-              <a:schemeClr val="accent1"/>
-            </a:effectRef>
-            <a:fontRef idx="minor">
-              <a:schemeClr val="lt1"/>
-            </a:fontRef>
-          </p:style>
-          <p:txBody>
-            <a:bodyPr rtlCol="0" anchor="ctr"/>
-            <a:lstStyle/>
-            <a:p>
-              <a:pPr algn="ctr"/>
-              <a:endParaRPr kumimoji="1" lang="ja-JP" altLang="en-US" sz="900">
-                <a:solidFill>
-                  <a:schemeClr val="accent2"/>
-                </a:solidFill>
+              <a:r>
+                <a:rPr lang="en-US" altLang="ja-JP" sz="600" dirty="0">
+                  <a:latin typeface="Arial" charset="0"/>
+                </a:rPr>
+                <a:t>UUID</a:t>
+              </a:r>
+              <a:endParaRPr lang="ja-JP" altLang="en-US" sz="600" dirty="0">
+                <a:latin typeface="Arial" charset="0"/>
               </a:endParaRPr>
             </a:p>
           </p:txBody>
@@ -5333,22 +5082,25 @@
         <p:cxnSp>
           <p:nvCxnSpPr>
             <p:cNvPr id="102" name="直線矢印コネクタ 101"/>
-            <p:cNvCxnSpPr/>
+            <p:cNvCxnSpPr>
+              <a:stCxn id="101" idx="2"/>
+            </p:cNvCxnSpPr>
             <p:nvPr/>
           </p:nvCxnSpPr>
           <p:spPr>
-            <a:xfrm flipH="1">
-              <a:off x="676131" y="7660817"/>
-              <a:ext cx="1880864" cy="0"/>
+            <a:xfrm flipH="1" flipV="1">
+              <a:off x="713097" y="7704132"/>
+              <a:ext cx="2012056" cy="11877"/>
             </a:xfrm>
             <a:prstGeom prst="straightConnector1">
               <a:avLst/>
             </a:prstGeom>
-            <a:ln w="19050">
+            <a:ln w="9525">
               <a:solidFill>
                 <a:schemeClr val="tx1"/>
               </a:solidFill>
-              <a:prstDash val="dash"/>
+              <a:prstDash val="sysDash"/>
+              <a:headEnd w="med" len="sm"/>
               <a:tailEnd type="arrow"/>
             </a:ln>
           </p:spPr>
@@ -5375,8 +5127,8 @@
           </p:nvSpPr>
           <p:spPr>
             <a:xfrm>
-              <a:off x="802578" y="7754239"/>
-              <a:ext cx="1459406" cy="195753"/>
+              <a:off x="1077928" y="7719627"/>
+              <a:ext cx="640857" cy="167788"/>
             </a:xfrm>
             <a:prstGeom prst="rect">
               <a:avLst/>
@@ -5394,14 +5146,20 @@
             <a:lstStyle/>
             <a:p>
               <a:r>
-                <a:rPr lang="en-US" altLang="ja-JP" sz="700" dirty="0"/>
-                <a:t>[Response] </a:t>
+                <a:rPr lang="en-US" altLang="ja-JP" sz="600" dirty="0" smtClean="0">
+                  <a:latin typeface="Arial" charset="0"/>
+                </a:rPr>
+                <a:t>Trip </a:t>
               </a:r>
               <a:r>
-                <a:rPr lang="en-US" altLang="ja-JP" sz="700" dirty="0" smtClean="0"/>
-                <a:t>Trip Detail</a:t>
+                <a:rPr lang="en-US" altLang="ja-JP" sz="600" dirty="0">
+                  <a:latin typeface="Arial" charset="0"/>
+                </a:rPr>
+                <a:t>Detail</a:t>
               </a:r>
-              <a:endParaRPr lang="ja-JP" altLang="en-US" sz="700" dirty="0"/>
+              <a:endParaRPr lang="ja-JP" altLang="en-US" sz="600" dirty="0">
+                <a:latin typeface="Arial" charset="0"/>
+              </a:endParaRPr>
             </a:p>
           </p:txBody>
         </p:sp>
@@ -5413,8 +5171,8 @@
           </p:nvSpPr>
           <p:spPr>
             <a:xfrm>
-              <a:off x="2910548" y="7443963"/>
-              <a:ext cx="2015093" cy="240684"/>
+              <a:off x="2910548" y="7443962"/>
+              <a:ext cx="2076959" cy="223718"/>
             </a:xfrm>
             <a:prstGeom prst="rect">
               <a:avLst/>
@@ -5428,17 +5186,672 @@
             <a:lstStyle/>
             <a:p>
               <a:r>
-                <a:rPr lang="en-US" altLang="ja-JP" sz="800" dirty="0" smtClean="0">
+                <a:rPr lang="en-US" altLang="ja-JP" sz="800" dirty="0">
                   <a:solidFill>
-                    <a:schemeClr val="accent2"/>
+                    <a:schemeClr val="accent5"/>
                   </a:solidFill>
+                  <a:latin typeface="Arial" charset="0"/>
                 </a:rPr>
                 <a:t>API: getAnalyzedTripInfo</a:t>
               </a:r>
             </a:p>
           </p:txBody>
         </p:sp>
+        <p:sp>
+          <p:nvSpPr>
+            <p:cNvPr id="77" name="正方形/長方形 76"/>
+            <p:cNvSpPr/>
+            <p:nvPr/>
+          </p:nvSpPr>
+          <p:spPr>
+            <a:xfrm>
+              <a:off x="2647264" y="4265987"/>
+              <a:ext cx="155780" cy="311260"/>
+            </a:xfrm>
+            <a:prstGeom prst="rect">
+              <a:avLst/>
+            </a:prstGeom>
+            <a:solidFill>
+              <a:schemeClr val="accent5"/>
+            </a:solidFill>
+            <a:ln/>
+            <a:effectLst>
+              <a:outerShdw blurRad="50800" dist="76200" dir="2700000" algn="tl" rotWithShape="0">
+                <a:prstClr val="black">
+                  <a:alpha val="40000"/>
+                </a:prstClr>
+              </a:outerShdw>
+            </a:effectLst>
+          </p:spPr>
+          <p:style>
+            <a:lnRef idx="2">
+              <a:schemeClr val="accent1">
+                <a:shade val="50000"/>
+              </a:schemeClr>
+            </a:lnRef>
+            <a:fillRef idx="1">
+              <a:schemeClr val="accent1"/>
+            </a:fillRef>
+            <a:effectRef idx="0">
+              <a:schemeClr val="accent1"/>
+            </a:effectRef>
+            <a:fontRef idx="minor">
+              <a:schemeClr val="lt1"/>
+            </a:fontRef>
+          </p:style>
+          <p:txBody>
+            <a:bodyPr rtlCol="0" anchor="ctr"/>
+            <a:lstStyle/>
+            <a:p>
+              <a:pPr algn="ctr"/>
+              <a:endParaRPr lang="ja-JP" altLang="en-US" sz="600">
+                <a:solidFill>
+                  <a:schemeClr val="accent2"/>
+                </a:solidFill>
+                <a:latin typeface="Arial" charset="0"/>
+              </a:endParaRPr>
+            </a:p>
+          </p:txBody>
+        </p:sp>
+        <p:sp>
+          <p:nvSpPr>
+            <p:cNvPr id="95" name="正方形/長方形 94"/>
+            <p:cNvSpPr/>
+            <p:nvPr/>
+          </p:nvSpPr>
+          <p:spPr>
+            <a:xfrm>
+              <a:off x="2647264" y="6316365"/>
+              <a:ext cx="155780" cy="311260"/>
+            </a:xfrm>
+            <a:prstGeom prst="rect">
+              <a:avLst/>
+            </a:prstGeom>
+            <a:solidFill>
+              <a:schemeClr val="accent5"/>
+            </a:solidFill>
+            <a:ln/>
+            <a:effectLst>
+              <a:outerShdw blurRad="50800" dist="76200" dir="2700000" algn="tl" rotWithShape="0">
+                <a:prstClr val="black">
+                  <a:alpha val="40000"/>
+                </a:prstClr>
+              </a:outerShdw>
+            </a:effectLst>
+          </p:spPr>
+          <p:style>
+            <a:lnRef idx="2">
+              <a:schemeClr val="accent1">
+                <a:shade val="50000"/>
+              </a:schemeClr>
+            </a:lnRef>
+            <a:fillRef idx="1">
+              <a:schemeClr val="accent1"/>
+            </a:fillRef>
+            <a:effectRef idx="0">
+              <a:schemeClr val="accent1"/>
+            </a:effectRef>
+            <a:fontRef idx="minor">
+              <a:schemeClr val="lt1"/>
+            </a:fontRef>
+          </p:style>
+          <p:txBody>
+            <a:bodyPr rtlCol="0" anchor="ctr"/>
+            <a:lstStyle/>
+            <a:p>
+              <a:pPr algn="ctr"/>
+              <a:endParaRPr lang="ja-JP" altLang="en-US" sz="600">
+                <a:solidFill>
+                  <a:schemeClr val="accent2"/>
+                </a:solidFill>
+                <a:latin typeface="Arial" charset="0"/>
+              </a:endParaRPr>
+            </a:p>
+          </p:txBody>
+        </p:sp>
+        <p:sp>
+          <p:nvSpPr>
+            <p:cNvPr id="101" name="正方形/長方形 100"/>
+            <p:cNvSpPr/>
+            <p:nvPr/>
+          </p:nvSpPr>
+          <p:spPr>
+            <a:xfrm>
+              <a:off x="2646650" y="7404749"/>
+              <a:ext cx="157006" cy="311260"/>
+            </a:xfrm>
+            <a:prstGeom prst="rect">
+              <a:avLst/>
+            </a:prstGeom>
+            <a:solidFill>
+              <a:schemeClr val="accent5"/>
+            </a:solidFill>
+            <a:ln/>
+            <a:effectLst>
+              <a:outerShdw blurRad="50800" dist="76200" dir="2700000" algn="tl" rotWithShape="0">
+                <a:prstClr val="black">
+                  <a:alpha val="40000"/>
+                </a:prstClr>
+              </a:outerShdw>
+            </a:effectLst>
+          </p:spPr>
+          <p:style>
+            <a:lnRef idx="2">
+              <a:schemeClr val="accent1">
+                <a:shade val="50000"/>
+              </a:schemeClr>
+            </a:lnRef>
+            <a:fillRef idx="1">
+              <a:schemeClr val="accent1"/>
+            </a:fillRef>
+            <a:effectRef idx="0">
+              <a:schemeClr val="accent1"/>
+            </a:effectRef>
+            <a:fontRef idx="minor">
+              <a:schemeClr val="lt1"/>
+            </a:fontRef>
+          </p:style>
+          <p:txBody>
+            <a:bodyPr rtlCol="0" anchor="ctr"/>
+            <a:lstStyle/>
+            <a:p>
+              <a:pPr algn="ctr"/>
+              <a:endParaRPr lang="ja-JP" altLang="en-US" sz="600">
+                <a:solidFill>
+                  <a:schemeClr val="accent2"/>
+                </a:solidFill>
+                <a:latin typeface="Arial" charset="0"/>
+              </a:endParaRPr>
+            </a:p>
+          </p:txBody>
+        </p:sp>
+        <p:sp>
+          <p:nvSpPr>
+            <p:cNvPr id="60" name="正方形/長方形 59"/>
+            <p:cNvSpPr/>
+            <p:nvPr/>
+          </p:nvSpPr>
+          <p:spPr>
+            <a:xfrm>
+              <a:off x="2647264" y="3404918"/>
+              <a:ext cx="155780" cy="311260"/>
+            </a:xfrm>
+            <a:prstGeom prst="rect">
+              <a:avLst/>
+            </a:prstGeom>
+            <a:solidFill>
+              <a:schemeClr val="accent5"/>
+            </a:solidFill>
+            <a:ln/>
+            <a:effectLst>
+              <a:outerShdw blurRad="50800" dist="76200" dir="2700000" algn="tl" rotWithShape="0">
+                <a:prstClr val="black">
+                  <a:alpha val="40000"/>
+                </a:prstClr>
+              </a:outerShdw>
+            </a:effectLst>
+          </p:spPr>
+          <p:style>
+            <a:lnRef idx="2">
+              <a:schemeClr val="accent1">
+                <a:shade val="50000"/>
+              </a:schemeClr>
+            </a:lnRef>
+            <a:fillRef idx="1">
+              <a:schemeClr val="accent1"/>
+            </a:fillRef>
+            <a:effectRef idx="0">
+              <a:schemeClr val="accent1"/>
+            </a:effectRef>
+            <a:fontRef idx="minor">
+              <a:schemeClr val="lt1"/>
+            </a:fontRef>
+          </p:style>
+          <p:txBody>
+            <a:bodyPr rtlCol="0" anchor="ctr"/>
+            <a:lstStyle/>
+            <a:p>
+              <a:pPr algn="ctr"/>
+              <a:endParaRPr lang="ja-JP" altLang="en-US" sz="600">
+                <a:solidFill>
+                  <a:schemeClr val="accent2"/>
+                </a:solidFill>
+                <a:latin typeface="Arial" charset="0"/>
+              </a:endParaRPr>
+            </a:p>
+          </p:txBody>
+        </p:sp>
       </p:grpSp>
+      <p:cxnSp>
+        <p:nvCxnSpPr>
+          <p:cNvPr id="61" name="直線矢印コネクタ 60"/>
+          <p:cNvCxnSpPr/>
+          <p:nvPr/>
+        </p:nvCxnSpPr>
+        <p:spPr>
+          <a:xfrm flipH="1" flipV="1">
+            <a:off x="2412307" y="3482592"/>
+            <a:ext cx="1061143" cy="383"/>
+          </a:xfrm>
+          <a:prstGeom prst="straightConnector1">
+            <a:avLst/>
+          </a:prstGeom>
+          <a:ln w="9525">
+            <a:solidFill>
+              <a:schemeClr val="tx1"/>
+            </a:solidFill>
+            <a:prstDash val="sysDash"/>
+            <a:tailEnd type="arrow"/>
+          </a:ln>
+        </p:spPr>
+        <p:style>
+          <a:lnRef idx="1">
+            <a:schemeClr val="accent1"/>
+          </a:lnRef>
+          <a:fillRef idx="0">
+            <a:schemeClr val="accent1"/>
+          </a:fillRef>
+          <a:effectRef idx="0">
+            <a:schemeClr val="accent1"/>
+          </a:effectRef>
+          <a:fontRef idx="minor">
+            <a:schemeClr val="tx1"/>
+          </a:fontRef>
+        </p:style>
+      </p:cxnSp>
+      <p:pic>
+        <p:nvPicPr>
+          <p:cNvPr id="18" name="図 17"/>
+          <p:cNvPicPr>
+            <a:picLocks noChangeAspect="1"/>
+          </p:cNvPicPr>
+          <p:nvPr/>
+        </p:nvPicPr>
+        <p:blipFill>
+          <a:blip r:embed="rId2"/>
+          <a:stretch>
+            <a:fillRect/>
+          </a:stretch>
+        </p:blipFill>
+        <p:spPr>
+          <a:xfrm>
+            <a:off x="3272403" y="1047570"/>
+            <a:ext cx="486079" cy="486079"/>
+          </a:xfrm>
+          <a:prstGeom prst="rect">
+            <a:avLst/>
+          </a:prstGeom>
+          <a:effectLst>
+            <a:outerShdw blurRad="50800" dist="76200" dir="2700000" algn="tl" rotWithShape="0">
+              <a:prstClr val="black">
+                <a:alpha val="40000"/>
+              </a:prstClr>
+            </a:outerShdw>
+          </a:effectLst>
+        </p:spPr>
+      </p:pic>
+      <p:pic>
+        <p:nvPicPr>
+          <p:cNvPr id="30" name="図 29"/>
+          <p:cNvPicPr>
+            <a:picLocks noChangeAspect="1"/>
+          </p:cNvPicPr>
+          <p:nvPr/>
+        </p:nvPicPr>
+        <p:blipFill>
+          <a:blip r:embed="rId3"/>
+          <a:stretch>
+            <a:fillRect/>
+          </a:stretch>
+        </p:blipFill>
+        <p:spPr>
+          <a:xfrm>
+            <a:off x="4278961" y="1052536"/>
+            <a:ext cx="486079" cy="486079"/>
+          </a:xfrm>
+          <a:prstGeom prst="rect">
+            <a:avLst/>
+          </a:prstGeom>
+          <a:effectLst>
+            <a:outerShdw blurRad="50800" dist="76200" dir="2700000" algn="tl" rotWithShape="0">
+              <a:prstClr val="black">
+                <a:alpha val="40000"/>
+              </a:prstClr>
+            </a:outerShdw>
+          </a:effectLst>
+        </p:spPr>
+      </p:pic>
+      <p:cxnSp>
+        <p:nvCxnSpPr>
+          <p:cNvPr id="76" name="直線矢印コネクタ 75"/>
+          <p:cNvCxnSpPr/>
+          <p:nvPr/>
+        </p:nvCxnSpPr>
+        <p:spPr>
+          <a:xfrm flipV="1">
+            <a:off x="2413000" y="3784600"/>
+            <a:ext cx="1066800" cy="3175"/>
+          </a:xfrm>
+          <a:prstGeom prst="straightConnector1">
+            <a:avLst/>
+          </a:prstGeom>
+          <a:ln w="9525">
+            <a:solidFill>
+              <a:schemeClr val="tx1"/>
+            </a:solidFill>
+            <a:headEnd type="none" w="med" len="med"/>
+            <a:tailEnd type="triangle" w="med" len="med"/>
+          </a:ln>
+        </p:spPr>
+        <p:style>
+          <a:lnRef idx="1">
+            <a:schemeClr val="accent1"/>
+          </a:lnRef>
+          <a:fillRef idx="0">
+            <a:schemeClr val="accent1"/>
+          </a:fillRef>
+          <a:effectRef idx="0">
+            <a:schemeClr val="accent1"/>
+          </a:effectRef>
+          <a:fontRef idx="minor">
+            <a:schemeClr val="tx1"/>
+          </a:fontRef>
+        </p:style>
+      </p:cxnSp>
+      <p:cxnSp>
+        <p:nvCxnSpPr>
+          <p:cNvPr id="80" name="直線矢印コネクタ 79"/>
+          <p:cNvCxnSpPr/>
+          <p:nvPr/>
+        </p:nvCxnSpPr>
+        <p:spPr>
+          <a:xfrm flipH="1" flipV="1">
+            <a:off x="2416599" y="4516755"/>
+            <a:ext cx="1114001" cy="3655"/>
+          </a:xfrm>
+          <a:prstGeom prst="straightConnector1">
+            <a:avLst/>
+          </a:prstGeom>
+          <a:ln w="9525">
+            <a:solidFill>
+              <a:schemeClr val="tx1"/>
+            </a:solidFill>
+            <a:prstDash val="sysDash"/>
+            <a:tailEnd type="arrow"/>
+          </a:ln>
+        </p:spPr>
+        <p:style>
+          <a:lnRef idx="1">
+            <a:schemeClr val="accent1"/>
+          </a:lnRef>
+          <a:fillRef idx="0">
+            <a:schemeClr val="accent1"/>
+          </a:fillRef>
+          <a:effectRef idx="0">
+            <a:schemeClr val="accent1"/>
+          </a:effectRef>
+          <a:fontRef idx="minor">
+            <a:schemeClr val="tx1"/>
+          </a:fontRef>
+        </p:style>
+      </p:cxnSp>
+      <p:sp>
+        <p:nvSpPr>
+          <p:cNvPr id="82" name="正方形/長方形 81"/>
+          <p:cNvSpPr/>
+          <p:nvPr/>
+        </p:nvSpPr>
+        <p:spPr>
+          <a:xfrm>
+            <a:off x="3494087" y="4349125"/>
+            <a:ext cx="85725" cy="171285"/>
+          </a:xfrm>
+          <a:prstGeom prst="rect">
+            <a:avLst/>
+          </a:prstGeom>
+          <a:solidFill>
+            <a:schemeClr val="accent5"/>
+          </a:solidFill>
+          <a:ln/>
+          <a:effectLst>
+            <a:outerShdw blurRad="50800" dist="76200" dir="2700000" algn="tl" rotWithShape="0">
+              <a:prstClr val="black">
+                <a:alpha val="40000"/>
+              </a:prstClr>
+            </a:outerShdw>
+          </a:effectLst>
+        </p:spPr>
+        <p:style>
+          <a:lnRef idx="2">
+            <a:schemeClr val="accent1">
+              <a:shade val="50000"/>
+            </a:schemeClr>
+          </a:lnRef>
+          <a:fillRef idx="1">
+            <a:schemeClr val="accent1"/>
+          </a:fillRef>
+          <a:effectRef idx="0">
+            <a:schemeClr val="accent1"/>
+          </a:effectRef>
+          <a:fontRef idx="minor">
+            <a:schemeClr val="lt1"/>
+          </a:fontRef>
+        </p:style>
+        <p:txBody>
+          <a:bodyPr rtlCol="0" anchor="ctr"/>
+          <a:lstStyle/>
+          <a:p>
+            <a:pPr algn="ctr"/>
+            <a:endParaRPr lang="ja-JP" altLang="en-US" sz="600">
+              <a:solidFill>
+                <a:schemeClr val="accent2"/>
+              </a:solidFill>
+              <a:latin typeface="Arial" charset="0"/>
+            </a:endParaRPr>
+          </a:p>
+        </p:txBody>
+      </p:sp>
+      <p:cxnSp>
+        <p:nvCxnSpPr>
+          <p:cNvPr id="87" name="直線矢印コネクタ 86"/>
+          <p:cNvCxnSpPr/>
+          <p:nvPr/>
+        </p:nvCxnSpPr>
+        <p:spPr>
+          <a:xfrm flipV="1">
+            <a:off x="2419350" y="4346575"/>
+            <a:ext cx="1066800" cy="3175"/>
+          </a:xfrm>
+          <a:prstGeom prst="straightConnector1">
+            <a:avLst/>
+          </a:prstGeom>
+          <a:ln w="9525">
+            <a:solidFill>
+              <a:schemeClr val="tx1"/>
+            </a:solidFill>
+            <a:headEnd type="none" w="med" len="med"/>
+            <a:tailEnd type="triangle" w="med" len="med"/>
+          </a:ln>
+        </p:spPr>
+        <p:style>
+          <a:lnRef idx="1">
+            <a:schemeClr val="accent1"/>
+          </a:lnRef>
+          <a:fillRef idx="0">
+            <a:schemeClr val="accent1"/>
+          </a:fillRef>
+          <a:effectRef idx="0">
+            <a:schemeClr val="accent1"/>
+          </a:effectRef>
+          <a:fontRef idx="minor">
+            <a:schemeClr val="tx1"/>
+          </a:fontRef>
+        </p:style>
+      </p:cxnSp>
+      <p:cxnSp>
+        <p:nvCxnSpPr>
+          <p:cNvPr id="99" name="直線矢印コネクタ 98"/>
+          <p:cNvCxnSpPr/>
+          <p:nvPr/>
+        </p:nvCxnSpPr>
+        <p:spPr>
+          <a:xfrm flipV="1">
+            <a:off x="2419350" y="4914900"/>
+            <a:ext cx="1066800" cy="3175"/>
+          </a:xfrm>
+          <a:prstGeom prst="straightConnector1">
+            <a:avLst/>
+          </a:prstGeom>
+          <a:ln w="9525">
+            <a:solidFill>
+              <a:schemeClr val="tx1"/>
+            </a:solidFill>
+            <a:headEnd type="none" w="med" len="med"/>
+            <a:tailEnd type="triangle" w="med" len="med"/>
+          </a:ln>
+        </p:spPr>
+        <p:style>
+          <a:lnRef idx="1">
+            <a:schemeClr val="accent1"/>
+          </a:lnRef>
+          <a:fillRef idx="0">
+            <a:schemeClr val="accent1"/>
+          </a:fillRef>
+          <a:effectRef idx="0">
+            <a:schemeClr val="accent1"/>
+          </a:effectRef>
+          <a:fontRef idx="minor">
+            <a:schemeClr val="tx1"/>
+          </a:fontRef>
+        </p:style>
+      </p:cxnSp>
+      <p:cxnSp>
+        <p:nvCxnSpPr>
+          <p:cNvPr id="105" name="直線矢印コネクタ 104"/>
+          <p:cNvCxnSpPr/>
+          <p:nvPr/>
+        </p:nvCxnSpPr>
+        <p:spPr>
+          <a:xfrm flipV="1">
+            <a:off x="2419350" y="5508625"/>
+            <a:ext cx="1066800" cy="3175"/>
+          </a:xfrm>
+          <a:prstGeom prst="straightConnector1">
+            <a:avLst/>
+          </a:prstGeom>
+          <a:ln w="9525">
+            <a:solidFill>
+              <a:schemeClr val="tx1"/>
+            </a:solidFill>
+            <a:headEnd type="none" w="med" len="med"/>
+            <a:tailEnd type="triangle" w="med" len="med"/>
+          </a:ln>
+        </p:spPr>
+        <p:style>
+          <a:lnRef idx="1">
+            <a:schemeClr val="accent1"/>
+          </a:lnRef>
+          <a:fillRef idx="0">
+            <a:schemeClr val="accent1"/>
+          </a:fillRef>
+          <a:effectRef idx="0">
+            <a:schemeClr val="accent1"/>
+          </a:effectRef>
+          <a:fontRef idx="minor">
+            <a:schemeClr val="tx1"/>
+          </a:fontRef>
+        </p:style>
+      </p:cxnSp>
+      <p:sp>
+        <p:nvSpPr>
+          <p:cNvPr id="46" name="円/楕円 45"/>
+          <p:cNvSpPr/>
+          <p:nvPr/>
+        </p:nvSpPr>
+        <p:spPr>
+          <a:xfrm>
+            <a:off x="2276475" y="1079500"/>
+            <a:ext cx="234950" cy="228600"/>
+          </a:xfrm>
+          <a:prstGeom prst="ellipse">
+            <a:avLst/>
+          </a:prstGeom>
+          <a:effectLst>
+            <a:outerShdw blurRad="50800" dist="76200" dir="2700000" algn="tl" rotWithShape="0">
+              <a:prstClr val="black">
+                <a:alpha val="40000"/>
+              </a:prstClr>
+            </a:outerShdw>
+          </a:effectLst>
+        </p:spPr>
+        <p:style>
+          <a:lnRef idx="1">
+            <a:schemeClr val="dk1"/>
+          </a:lnRef>
+          <a:fillRef idx="2">
+            <a:schemeClr val="dk1"/>
+          </a:fillRef>
+          <a:effectRef idx="1">
+            <a:schemeClr val="dk1"/>
+          </a:effectRef>
+          <a:fontRef idx="minor">
+            <a:schemeClr val="dk1"/>
+          </a:fontRef>
+        </p:style>
+        <p:txBody>
+          <a:bodyPr rtlCol="0" anchor="ctr"/>
+          <a:lstStyle/>
+          <a:p>
+            <a:pPr algn="ctr"/>
+            <a:endParaRPr kumimoji="1" lang="ja-JP" altLang="en-US"/>
+          </a:p>
+        </p:txBody>
+      </p:sp>
+      <p:sp>
+        <p:nvSpPr>
+          <p:cNvPr id="47" name="台形 46"/>
+          <p:cNvSpPr/>
+          <p:nvPr/>
+        </p:nvSpPr>
+        <p:spPr>
+          <a:xfrm>
+            <a:off x="2222500" y="1330325"/>
+            <a:ext cx="342900" cy="206375"/>
+          </a:xfrm>
+          <a:prstGeom prst="trapezoid">
+            <a:avLst/>
+          </a:prstGeom>
+          <a:effectLst>
+            <a:outerShdw blurRad="50800" dist="76200" dir="2700000" algn="tl" rotWithShape="0">
+              <a:prstClr val="black">
+                <a:alpha val="40000"/>
+              </a:prstClr>
+            </a:outerShdw>
+          </a:effectLst>
+        </p:spPr>
+        <p:style>
+          <a:lnRef idx="1">
+            <a:schemeClr val="dk1"/>
+          </a:lnRef>
+          <a:fillRef idx="2">
+            <a:schemeClr val="dk1"/>
+          </a:fillRef>
+          <a:effectRef idx="1">
+            <a:schemeClr val="dk1"/>
+          </a:effectRef>
+          <a:fontRef idx="minor">
+            <a:schemeClr val="dk1"/>
+          </a:fontRef>
+        </p:style>
+        <p:txBody>
+          <a:bodyPr rtlCol="0" anchor="ctr"/>
+          <a:lstStyle/>
+          <a:p>
+            <a:pPr algn="ctr"/>
+            <a:endParaRPr kumimoji="1" lang="ja-JP" altLang="en-US"/>
+          </a:p>
+        </p:txBody>
+      </p:sp>
     </p:spTree>
     <p:extLst>
       <p:ext uri="{BB962C8B-B14F-4D97-AF65-F5344CB8AC3E}">
@@ -5462,7 +5875,7 @@
 <file path=ppt/theme/theme1.xml><?xml version="1.0" encoding="utf-8"?>
 <a:theme xmlns:a="http://schemas.openxmlformats.org/drawingml/2006/main" name="Office テーマ">
   <a:themeElements>
-    <a:clrScheme name="Office テーマ">
+    <a:clrScheme name="ホワイト">
       <a:dk1>
         <a:sysClr val="windowText" lastClr="000000"/>
       </a:dk1>
@@ -5500,7 +5913,7 @@
         <a:srgbClr val="954F72"/>
       </a:folHlink>
     </a:clrScheme>
-    <a:fontScheme name="Office テーマ">
+    <a:fontScheme name="ホワイト">
       <a:majorFont>
         <a:latin typeface="Calibri Light" panose="020F0302020204030204"/>
         <a:ea typeface=""/>
@@ -5572,7 +5985,7 @@
         <a:font script="Geor" typeface="Sylfaen"/>
       </a:minorFont>
     </a:fontScheme>
-    <a:fmtScheme name="Office テーマ">
+    <a:fmtScheme name="ホワイト">
       <a:fillStyleLst>
         <a:solidFill>
           <a:schemeClr val="phClr"/>

</xml_diff>